<commit_message>
update syllabus design pattern
</commit_message>
<xml_diff>
--- a/syllabus/17-POO-design-pattern/17_syllabus.pptx
+++ b/syllabus/17-POO-design-pattern/17_syllabus.pptx
@@ -450,7 +450,7 @@
       </p15:notesGuideLst>
     </p:ext>
     <p:ext uri="http://customooxmlschemas.google.com/">
-      <go:slidesCustomData xmlns="" xmlns:mc="http://schemas.openxmlformats.org/markup-compatibility/2006" xmlns:mv="urn:schemas-microsoft-com:mac:vml" xmlns:c="http://schemas.openxmlformats.org/drawingml/2006/chart" xmlns:dgm="http://schemas.openxmlformats.org/drawingml/2006/diagram" xmlns:o="urn:schemas-microsoft-com:office:office" xmlns:v="urn:schemas-microsoft-com:vml" xmlns:pvml="urn:schemas-microsoft-com:office:powerpoint" xmlns:com="http://schemas.openxmlformats.org/drawingml/2006/compatibility" xmlns:p14="http://schemas.microsoft.com/office/powerpoint/2010/main" xmlns:p15="http://schemas.microsoft.com/office/powerpoint/2012/main" xmlns:ahyp="http://schemas.microsoft.com/office/drawing/2018/hyperlinkcolor" xmlns:go="http://customooxmlschemas.google.com/" r:id="rId82" roundtripDataSignature="AMtx7mjSZQRmqTMWKYRBXmlYNJjeBKn4Mw=="/>
+      <go:slidesCustomData xmlns:go="http://customooxmlschemas.google.com/" xmlns:ahyp="http://schemas.microsoft.com/office/drawing/2018/hyperlinkcolor" xmlns:p15="http://schemas.microsoft.com/office/powerpoint/2012/main" xmlns:p14="http://schemas.microsoft.com/office/powerpoint/2010/main" xmlns:com="http://schemas.openxmlformats.org/drawingml/2006/compatibility" xmlns:pvml="urn:schemas-microsoft-com:office:powerpoint" xmlns:v="urn:schemas-microsoft-com:vml" xmlns:o="urn:schemas-microsoft-com:office:office" xmlns:dgm="http://schemas.openxmlformats.org/drawingml/2006/diagram" xmlns:c="http://schemas.openxmlformats.org/drawingml/2006/chart" xmlns:mv="urn:schemas-microsoft-com:mac:vml" xmlns:mc="http://schemas.openxmlformats.org/markup-compatibility/2006" xmlns="" r:id="rId82" roundtripDataSignature="AMtx7mjSZQRmqTMWKYRBXmlYNJjeBKn4Mw=="/>
     </p:ext>
   </p:extLst>
 </p:presentation>
@@ -3090,7 +3090,7 @@
         <p14:reveal/>
       </p:transition>
     </mc:Choice>
-    <mc:Fallback xmlns="" xmlns:mv="urn:schemas-microsoft-com:mac:vml" xmlns:c="http://schemas.openxmlformats.org/drawingml/2006/chart" xmlns:dgm="http://schemas.openxmlformats.org/drawingml/2006/diagram" xmlns:o="urn:schemas-microsoft-com:office:office" xmlns:v="urn:schemas-microsoft-com:vml" xmlns:pvml="urn:schemas-microsoft-com:office:powerpoint" xmlns:com="http://schemas.openxmlformats.org/drawingml/2006/compatibility" xmlns:p15="http://schemas.microsoft.com/office/powerpoint/2012/main" xmlns:ahyp="http://schemas.microsoft.com/office/drawing/2018/hyperlinkcolor">
+    <mc:Fallback xmlns:ahyp="http://schemas.microsoft.com/office/drawing/2018/hyperlinkcolor" xmlns:p15="http://schemas.microsoft.com/office/powerpoint/2012/main" xmlns:com="http://schemas.openxmlformats.org/drawingml/2006/compatibility" xmlns:pvml="urn:schemas-microsoft-com:office:powerpoint" xmlns:v="urn:schemas-microsoft-com:vml" xmlns:o="urn:schemas-microsoft-com:office:office" xmlns:dgm="http://schemas.openxmlformats.org/drawingml/2006/diagram" xmlns:c="http://schemas.openxmlformats.org/drawingml/2006/chart" xmlns:mv="urn:schemas-microsoft-com:mac:vml" xmlns="">
       <p:transition spd="med">
         <p:fade/>
       </p:transition>
@@ -3404,7 +3404,7 @@
         <p14:reveal/>
       </p:transition>
     </mc:Choice>
-    <mc:Fallback xmlns="" xmlns:mv="urn:schemas-microsoft-com:mac:vml" xmlns:c="http://schemas.openxmlformats.org/drawingml/2006/chart" xmlns:dgm="http://schemas.openxmlformats.org/drawingml/2006/diagram" xmlns:o="urn:schemas-microsoft-com:office:office" xmlns:v="urn:schemas-microsoft-com:vml" xmlns:pvml="urn:schemas-microsoft-com:office:powerpoint" xmlns:com="http://schemas.openxmlformats.org/drawingml/2006/compatibility" xmlns:p15="http://schemas.microsoft.com/office/powerpoint/2012/main" xmlns:ahyp="http://schemas.microsoft.com/office/drawing/2018/hyperlinkcolor">
+    <mc:Fallback xmlns:ahyp="http://schemas.microsoft.com/office/drawing/2018/hyperlinkcolor" xmlns:p15="http://schemas.microsoft.com/office/powerpoint/2012/main" xmlns:com="http://schemas.openxmlformats.org/drawingml/2006/compatibility" xmlns:pvml="urn:schemas-microsoft-com:office:powerpoint" xmlns:v="urn:schemas-microsoft-com:vml" xmlns:o="urn:schemas-microsoft-com:office:office" xmlns:dgm="http://schemas.openxmlformats.org/drawingml/2006/diagram" xmlns:c="http://schemas.openxmlformats.org/drawingml/2006/chart" xmlns:mv="urn:schemas-microsoft-com:mac:vml" xmlns="">
       <p:transition spd="med">
         <p:fade/>
       </p:transition>
@@ -3812,7 +3812,7 @@
         <p14:reveal/>
       </p:transition>
     </mc:Choice>
-    <mc:Fallback xmlns="" xmlns:mv="urn:schemas-microsoft-com:mac:vml" xmlns:c="http://schemas.openxmlformats.org/drawingml/2006/chart" xmlns:dgm="http://schemas.openxmlformats.org/drawingml/2006/diagram" xmlns:o="urn:schemas-microsoft-com:office:office" xmlns:v="urn:schemas-microsoft-com:vml" xmlns:pvml="urn:schemas-microsoft-com:office:powerpoint" xmlns:com="http://schemas.openxmlformats.org/drawingml/2006/compatibility" xmlns:p15="http://schemas.microsoft.com/office/powerpoint/2012/main" xmlns:ahyp="http://schemas.microsoft.com/office/drawing/2018/hyperlinkcolor">
+    <mc:Fallback xmlns:ahyp="http://schemas.microsoft.com/office/drawing/2018/hyperlinkcolor" xmlns:p15="http://schemas.microsoft.com/office/powerpoint/2012/main" xmlns:com="http://schemas.openxmlformats.org/drawingml/2006/compatibility" xmlns:pvml="urn:schemas-microsoft-com:office:powerpoint" xmlns:v="urn:schemas-microsoft-com:vml" xmlns:o="urn:schemas-microsoft-com:office:office" xmlns:dgm="http://schemas.openxmlformats.org/drawingml/2006/diagram" xmlns:c="http://schemas.openxmlformats.org/drawingml/2006/chart" xmlns:mv="urn:schemas-microsoft-com:mac:vml" xmlns="">
       <p:transition spd="med">
         <p:fade/>
       </p:transition>
@@ -4174,7 +4174,7 @@
         <p14:reveal/>
       </p:transition>
     </mc:Choice>
-    <mc:Fallback xmlns="" xmlns:mv="urn:schemas-microsoft-com:mac:vml" xmlns:c="http://schemas.openxmlformats.org/drawingml/2006/chart" xmlns:dgm="http://schemas.openxmlformats.org/drawingml/2006/diagram" xmlns:o="urn:schemas-microsoft-com:office:office" xmlns:v="urn:schemas-microsoft-com:vml" xmlns:pvml="urn:schemas-microsoft-com:office:powerpoint" xmlns:com="http://schemas.openxmlformats.org/drawingml/2006/compatibility" xmlns:p15="http://schemas.microsoft.com/office/powerpoint/2012/main" xmlns:ahyp="http://schemas.microsoft.com/office/drawing/2018/hyperlinkcolor">
+    <mc:Fallback xmlns:ahyp="http://schemas.microsoft.com/office/drawing/2018/hyperlinkcolor" xmlns:p15="http://schemas.microsoft.com/office/powerpoint/2012/main" xmlns:com="http://schemas.openxmlformats.org/drawingml/2006/compatibility" xmlns:pvml="urn:schemas-microsoft-com:office:powerpoint" xmlns:v="urn:schemas-microsoft-com:vml" xmlns:o="urn:schemas-microsoft-com:office:office" xmlns:dgm="http://schemas.openxmlformats.org/drawingml/2006/diagram" xmlns:c="http://schemas.openxmlformats.org/drawingml/2006/chart" xmlns:mv="urn:schemas-microsoft-com:mac:vml" xmlns="">
       <p:transition spd="med">
         <p:fade/>
       </p:transition>
@@ -4737,7 +4737,7 @@
         <p14:reveal/>
       </p:transition>
     </mc:Choice>
-    <mc:Fallback xmlns="" xmlns:mv="urn:schemas-microsoft-com:mac:vml" xmlns:c="http://schemas.openxmlformats.org/drawingml/2006/chart" xmlns:dgm="http://schemas.openxmlformats.org/drawingml/2006/diagram" xmlns:o="urn:schemas-microsoft-com:office:office" xmlns:v="urn:schemas-microsoft-com:vml" xmlns:pvml="urn:schemas-microsoft-com:office:powerpoint" xmlns:com="http://schemas.openxmlformats.org/drawingml/2006/compatibility" xmlns:p15="http://schemas.microsoft.com/office/powerpoint/2012/main" xmlns:ahyp="http://schemas.microsoft.com/office/drawing/2018/hyperlinkcolor">
+    <mc:Fallback xmlns:ahyp="http://schemas.microsoft.com/office/drawing/2018/hyperlinkcolor" xmlns:p15="http://schemas.microsoft.com/office/powerpoint/2012/main" xmlns:com="http://schemas.openxmlformats.org/drawingml/2006/compatibility" xmlns:pvml="urn:schemas-microsoft-com:office:powerpoint" xmlns:v="urn:schemas-microsoft-com:vml" xmlns:o="urn:schemas-microsoft-com:office:office" xmlns:dgm="http://schemas.openxmlformats.org/drawingml/2006/diagram" xmlns:c="http://schemas.openxmlformats.org/drawingml/2006/chart" xmlns:mv="urn:schemas-microsoft-com:mac:vml" xmlns="">
       <p:transition spd="med">
         <p:fade/>
       </p:transition>
@@ -5333,7 +5333,7 @@
         <p14:reveal/>
       </p:transition>
     </mc:Choice>
-    <mc:Fallback xmlns="" xmlns:mv="urn:schemas-microsoft-com:mac:vml" xmlns:c="http://schemas.openxmlformats.org/drawingml/2006/chart" xmlns:dgm="http://schemas.openxmlformats.org/drawingml/2006/diagram" xmlns:o="urn:schemas-microsoft-com:office:office" xmlns:v="urn:schemas-microsoft-com:vml" xmlns:pvml="urn:schemas-microsoft-com:office:powerpoint" xmlns:com="http://schemas.openxmlformats.org/drawingml/2006/compatibility" xmlns:p15="http://schemas.microsoft.com/office/powerpoint/2012/main" xmlns:ahyp="http://schemas.microsoft.com/office/drawing/2018/hyperlinkcolor">
+    <mc:Fallback xmlns:ahyp="http://schemas.microsoft.com/office/drawing/2018/hyperlinkcolor" xmlns:p15="http://schemas.microsoft.com/office/powerpoint/2012/main" xmlns:com="http://schemas.openxmlformats.org/drawingml/2006/compatibility" xmlns:pvml="urn:schemas-microsoft-com:office:powerpoint" xmlns:v="urn:schemas-microsoft-com:vml" xmlns:o="urn:schemas-microsoft-com:office:office" xmlns:dgm="http://schemas.openxmlformats.org/drawingml/2006/diagram" xmlns:c="http://schemas.openxmlformats.org/drawingml/2006/chart" xmlns:mv="urn:schemas-microsoft-com:mac:vml" xmlns="">
       <p:transition spd="med">
         <p:fade/>
       </p:transition>
@@ -5513,7 +5513,7 @@
         <p14:reveal/>
       </p:transition>
     </mc:Choice>
-    <mc:Fallback xmlns="" xmlns:mv="urn:schemas-microsoft-com:mac:vml" xmlns:c="http://schemas.openxmlformats.org/drawingml/2006/chart" xmlns:dgm="http://schemas.openxmlformats.org/drawingml/2006/diagram" xmlns:o="urn:schemas-microsoft-com:office:office" xmlns:v="urn:schemas-microsoft-com:vml" xmlns:pvml="urn:schemas-microsoft-com:office:powerpoint" xmlns:com="http://schemas.openxmlformats.org/drawingml/2006/compatibility" xmlns:p15="http://schemas.microsoft.com/office/powerpoint/2012/main" xmlns:ahyp="http://schemas.microsoft.com/office/drawing/2018/hyperlinkcolor">
+    <mc:Fallback xmlns:ahyp="http://schemas.microsoft.com/office/drawing/2018/hyperlinkcolor" xmlns:p15="http://schemas.microsoft.com/office/powerpoint/2012/main" xmlns:com="http://schemas.openxmlformats.org/drawingml/2006/compatibility" xmlns:pvml="urn:schemas-microsoft-com:office:powerpoint" xmlns:v="urn:schemas-microsoft-com:vml" xmlns:o="urn:schemas-microsoft-com:office:office" xmlns:dgm="http://schemas.openxmlformats.org/drawingml/2006/diagram" xmlns:c="http://schemas.openxmlformats.org/drawingml/2006/chart" xmlns:mv="urn:schemas-microsoft-com:mac:vml" xmlns="">
       <p:transition spd="med">
         <p:fade/>
       </p:transition>
@@ -5951,7 +5951,7 @@
         <p14:reveal/>
       </p:transition>
     </mc:Choice>
-    <mc:Fallback xmlns="" xmlns:mv="urn:schemas-microsoft-com:mac:vml" xmlns:c="http://schemas.openxmlformats.org/drawingml/2006/chart" xmlns:dgm="http://schemas.openxmlformats.org/drawingml/2006/diagram" xmlns:o="urn:schemas-microsoft-com:office:office" xmlns:v="urn:schemas-microsoft-com:vml" xmlns:pvml="urn:schemas-microsoft-com:office:powerpoint" xmlns:com="http://schemas.openxmlformats.org/drawingml/2006/compatibility" xmlns:p15="http://schemas.microsoft.com/office/powerpoint/2012/main" xmlns:ahyp="http://schemas.microsoft.com/office/drawing/2018/hyperlinkcolor">
+    <mc:Fallback xmlns:ahyp="http://schemas.microsoft.com/office/drawing/2018/hyperlinkcolor" xmlns:p15="http://schemas.microsoft.com/office/powerpoint/2012/main" xmlns:com="http://schemas.openxmlformats.org/drawingml/2006/compatibility" xmlns:pvml="urn:schemas-microsoft-com:office:powerpoint" xmlns:v="urn:schemas-microsoft-com:vml" xmlns:o="urn:schemas-microsoft-com:office:office" xmlns:dgm="http://schemas.openxmlformats.org/drawingml/2006/diagram" xmlns:c="http://schemas.openxmlformats.org/drawingml/2006/chart" xmlns:mv="urn:schemas-microsoft-com:mac:vml" xmlns="">
       <p:transition spd="med">
         <p:fade/>
       </p:transition>
@@ -6368,7 +6368,7 @@
         <p14:reveal/>
       </p:transition>
     </mc:Choice>
-    <mc:Fallback xmlns="" xmlns:mv="urn:schemas-microsoft-com:mac:vml" xmlns:c="http://schemas.openxmlformats.org/drawingml/2006/chart" xmlns:dgm="http://schemas.openxmlformats.org/drawingml/2006/diagram" xmlns:o="urn:schemas-microsoft-com:office:office" xmlns:v="urn:schemas-microsoft-com:vml" xmlns:pvml="urn:schemas-microsoft-com:office:powerpoint" xmlns:com="http://schemas.openxmlformats.org/drawingml/2006/compatibility" xmlns:p15="http://schemas.microsoft.com/office/powerpoint/2012/main" xmlns:ahyp="http://schemas.microsoft.com/office/drawing/2018/hyperlinkcolor">
+    <mc:Fallback xmlns:ahyp="http://schemas.microsoft.com/office/drawing/2018/hyperlinkcolor" xmlns:p15="http://schemas.microsoft.com/office/powerpoint/2012/main" xmlns:com="http://schemas.openxmlformats.org/drawingml/2006/compatibility" xmlns:pvml="urn:schemas-microsoft-com:office:powerpoint" xmlns:v="urn:schemas-microsoft-com:vml" xmlns:o="urn:schemas-microsoft-com:office:office" xmlns:dgm="http://schemas.openxmlformats.org/drawingml/2006/diagram" xmlns:c="http://schemas.openxmlformats.org/drawingml/2006/chart" xmlns:mv="urn:schemas-microsoft-com:mac:vml" xmlns="">
       <p:transition spd="med">
         <p:fade/>
       </p:transition>
@@ -7258,7 +7258,7 @@
         <p14:reveal/>
       </p:transition>
     </mc:Choice>
-    <mc:Fallback xmlns="" xmlns:mv="urn:schemas-microsoft-com:mac:vml" xmlns:c="http://schemas.openxmlformats.org/drawingml/2006/chart" xmlns:dgm="http://schemas.openxmlformats.org/drawingml/2006/diagram" xmlns:o="urn:schemas-microsoft-com:office:office" xmlns:v="urn:schemas-microsoft-com:vml" xmlns:pvml="urn:schemas-microsoft-com:office:powerpoint" xmlns:com="http://schemas.openxmlformats.org/drawingml/2006/compatibility" xmlns:p15="http://schemas.microsoft.com/office/powerpoint/2012/main" xmlns:ahyp="http://schemas.microsoft.com/office/drawing/2018/hyperlinkcolor">
+    <mc:Fallback xmlns:ahyp="http://schemas.microsoft.com/office/drawing/2018/hyperlinkcolor" xmlns:p15="http://schemas.microsoft.com/office/powerpoint/2012/main" xmlns:com="http://schemas.openxmlformats.org/drawingml/2006/compatibility" xmlns:pvml="urn:schemas-microsoft-com:office:powerpoint" xmlns:v="urn:schemas-microsoft-com:vml" xmlns:o="urn:schemas-microsoft-com:office:office" xmlns:dgm="http://schemas.openxmlformats.org/drawingml/2006/diagram" xmlns:c="http://schemas.openxmlformats.org/drawingml/2006/chart" xmlns:mv="urn:schemas-microsoft-com:mac:vml" xmlns="">
       <p:transition spd="med">
         <p:fade/>
       </p:transition>
@@ -7458,7 +7458,7 @@
         <p14:reveal/>
       </p:transition>
     </mc:Choice>
-    <mc:Fallback xmlns="" xmlns:mv="urn:schemas-microsoft-com:mac:vml" xmlns:c="http://schemas.openxmlformats.org/drawingml/2006/chart" xmlns:dgm="http://schemas.openxmlformats.org/drawingml/2006/diagram" xmlns:o="urn:schemas-microsoft-com:office:office" xmlns:v="urn:schemas-microsoft-com:vml" xmlns:pvml="urn:schemas-microsoft-com:office:powerpoint" xmlns:com="http://schemas.openxmlformats.org/drawingml/2006/compatibility" xmlns:p15="http://schemas.microsoft.com/office/powerpoint/2012/main" xmlns:ahyp="http://schemas.microsoft.com/office/drawing/2018/hyperlinkcolor">
+    <mc:Fallback xmlns:ahyp="http://schemas.microsoft.com/office/drawing/2018/hyperlinkcolor" xmlns:p15="http://schemas.microsoft.com/office/powerpoint/2012/main" xmlns:com="http://schemas.openxmlformats.org/drawingml/2006/compatibility" xmlns:pvml="urn:schemas-microsoft-com:office:powerpoint" xmlns:v="urn:schemas-microsoft-com:vml" xmlns:o="urn:schemas-microsoft-com:office:office" xmlns:dgm="http://schemas.openxmlformats.org/drawingml/2006/diagram" xmlns:c="http://schemas.openxmlformats.org/drawingml/2006/chart" xmlns:mv="urn:schemas-microsoft-com:mac:vml" xmlns="">
       <p:transition spd="med">
         <p:fade/>
       </p:transition>
@@ -7878,7 +7878,7 @@
         <p14:reveal/>
       </p:transition>
     </mc:Choice>
-    <mc:Fallback xmlns="" xmlns:mv="urn:schemas-microsoft-com:mac:vml" xmlns:c="http://schemas.openxmlformats.org/drawingml/2006/chart" xmlns:dgm="http://schemas.openxmlformats.org/drawingml/2006/diagram" xmlns:o="urn:schemas-microsoft-com:office:office" xmlns:v="urn:schemas-microsoft-com:vml" xmlns:pvml="urn:schemas-microsoft-com:office:powerpoint" xmlns:com="http://schemas.openxmlformats.org/drawingml/2006/compatibility" xmlns:p15="http://schemas.microsoft.com/office/powerpoint/2012/main" xmlns:ahyp="http://schemas.microsoft.com/office/drawing/2018/hyperlinkcolor">
+    <mc:Fallback xmlns:ahyp="http://schemas.microsoft.com/office/drawing/2018/hyperlinkcolor" xmlns:p15="http://schemas.microsoft.com/office/powerpoint/2012/main" xmlns:com="http://schemas.openxmlformats.org/drawingml/2006/compatibility" xmlns:pvml="urn:schemas-microsoft-com:office:powerpoint" xmlns:v="urn:schemas-microsoft-com:vml" xmlns:o="urn:schemas-microsoft-com:office:office" xmlns:dgm="http://schemas.openxmlformats.org/drawingml/2006/diagram" xmlns:c="http://schemas.openxmlformats.org/drawingml/2006/chart" xmlns:mv="urn:schemas-microsoft-com:mac:vml" xmlns="">
       <p:transition spd="med">
         <p:fade/>
       </p:transition>
@@ -9384,7 +9384,7 @@
         <p14:reveal/>
       </p:transition>
     </mc:Choice>
-    <mc:Fallback xmlns="" xmlns:mv="urn:schemas-microsoft-com:mac:vml" xmlns:c="http://schemas.openxmlformats.org/drawingml/2006/chart" xmlns:dgm="http://schemas.openxmlformats.org/drawingml/2006/diagram" xmlns:o="urn:schemas-microsoft-com:office:office" xmlns:v="urn:schemas-microsoft-com:vml" xmlns:pvml="urn:schemas-microsoft-com:office:powerpoint" xmlns:com="http://schemas.openxmlformats.org/drawingml/2006/compatibility" xmlns:p15="http://schemas.microsoft.com/office/powerpoint/2012/main" xmlns:ahyp="http://schemas.microsoft.com/office/drawing/2018/hyperlinkcolor">
+    <mc:Fallback xmlns:ahyp="http://schemas.microsoft.com/office/drawing/2018/hyperlinkcolor" xmlns:p15="http://schemas.microsoft.com/office/powerpoint/2012/main" xmlns:com="http://schemas.openxmlformats.org/drawingml/2006/compatibility" xmlns:pvml="urn:schemas-microsoft-com:office:powerpoint" xmlns:v="urn:schemas-microsoft-com:vml" xmlns:o="urn:schemas-microsoft-com:office:office" xmlns:dgm="http://schemas.openxmlformats.org/drawingml/2006/diagram" xmlns:c="http://schemas.openxmlformats.org/drawingml/2006/chart" xmlns:mv="urn:schemas-microsoft-com:mac:vml" xmlns="">
       <p:transition spd="med">
         <p:fade/>
       </p:transition>
@@ -9507,7 +9507,7 @@
         <p14:reveal/>
       </p:transition>
     </mc:Choice>
-    <mc:Fallback xmlns="" xmlns:mv="urn:schemas-microsoft-com:mac:vml" xmlns:c="http://schemas.openxmlformats.org/drawingml/2006/chart" xmlns:dgm="http://schemas.openxmlformats.org/drawingml/2006/diagram" xmlns:o="urn:schemas-microsoft-com:office:office" xmlns:v="urn:schemas-microsoft-com:vml" xmlns:pvml="urn:schemas-microsoft-com:office:powerpoint" xmlns:com="http://schemas.openxmlformats.org/drawingml/2006/compatibility" xmlns:p15="http://schemas.microsoft.com/office/powerpoint/2012/main" xmlns:ahyp="http://schemas.microsoft.com/office/drawing/2018/hyperlinkcolor">
+    <mc:Fallback xmlns:ahyp="http://schemas.microsoft.com/office/drawing/2018/hyperlinkcolor" xmlns:p15="http://schemas.microsoft.com/office/powerpoint/2012/main" xmlns:com="http://schemas.openxmlformats.org/drawingml/2006/compatibility" xmlns:pvml="urn:schemas-microsoft-com:office:powerpoint" xmlns:v="urn:schemas-microsoft-com:vml" xmlns:o="urn:schemas-microsoft-com:office:office" xmlns:dgm="http://schemas.openxmlformats.org/drawingml/2006/diagram" xmlns:c="http://schemas.openxmlformats.org/drawingml/2006/chart" xmlns:mv="urn:schemas-microsoft-com:mac:vml" xmlns="">
       <p:transition spd="med">
         <p:fade/>
       </p:transition>
@@ -10167,7 +10167,7 @@
         <p14:reveal/>
       </p:transition>
     </mc:Choice>
-    <mc:Fallback xmlns="" xmlns:mv="urn:schemas-microsoft-com:mac:vml" xmlns:c="http://schemas.openxmlformats.org/drawingml/2006/chart" xmlns:dgm="http://schemas.openxmlformats.org/drawingml/2006/diagram" xmlns:o="urn:schemas-microsoft-com:office:office" xmlns:v="urn:schemas-microsoft-com:vml" xmlns:pvml="urn:schemas-microsoft-com:office:powerpoint" xmlns:com="http://schemas.openxmlformats.org/drawingml/2006/compatibility" xmlns:p15="http://schemas.microsoft.com/office/powerpoint/2012/main" xmlns:ahyp="http://schemas.microsoft.com/office/drawing/2018/hyperlinkcolor">
+    <mc:Fallback xmlns:ahyp="http://schemas.microsoft.com/office/drawing/2018/hyperlinkcolor" xmlns:p15="http://schemas.microsoft.com/office/powerpoint/2012/main" xmlns:com="http://schemas.openxmlformats.org/drawingml/2006/compatibility" xmlns:pvml="urn:schemas-microsoft-com:office:powerpoint" xmlns:v="urn:schemas-microsoft-com:vml" xmlns:o="urn:schemas-microsoft-com:office:office" xmlns:dgm="http://schemas.openxmlformats.org/drawingml/2006/diagram" xmlns:c="http://schemas.openxmlformats.org/drawingml/2006/chart" xmlns:mv="urn:schemas-microsoft-com:mac:vml" xmlns="">
       <p:transition spd="med">
         <p:fade/>
       </p:transition>
@@ -10537,7 +10537,7 @@
         <p14:reveal/>
       </p:transition>
     </mc:Choice>
-    <mc:Fallback xmlns="" xmlns:mv="urn:schemas-microsoft-com:mac:vml" xmlns:c="http://schemas.openxmlformats.org/drawingml/2006/chart" xmlns:dgm="http://schemas.openxmlformats.org/drawingml/2006/diagram" xmlns:o="urn:schemas-microsoft-com:office:office" xmlns:v="urn:schemas-microsoft-com:vml" xmlns:pvml="urn:schemas-microsoft-com:office:powerpoint" xmlns:com="http://schemas.openxmlformats.org/drawingml/2006/compatibility" xmlns:p15="http://schemas.microsoft.com/office/powerpoint/2012/main" xmlns:ahyp="http://schemas.microsoft.com/office/drawing/2018/hyperlinkcolor">
+    <mc:Fallback xmlns:ahyp="http://schemas.microsoft.com/office/drawing/2018/hyperlinkcolor" xmlns:p15="http://schemas.microsoft.com/office/powerpoint/2012/main" xmlns:com="http://schemas.openxmlformats.org/drawingml/2006/compatibility" xmlns:pvml="urn:schemas-microsoft-com:office:powerpoint" xmlns:v="urn:schemas-microsoft-com:vml" xmlns:o="urn:schemas-microsoft-com:office:office" xmlns:dgm="http://schemas.openxmlformats.org/drawingml/2006/diagram" xmlns:c="http://schemas.openxmlformats.org/drawingml/2006/chart" xmlns:mv="urn:schemas-microsoft-com:mac:vml" xmlns="">
       <p:transition spd="med">
         <p:fade/>
       </p:transition>
@@ -11350,7 +11350,7 @@
         <p14:reveal/>
       </p:transition>
     </mc:Choice>
-    <mc:Fallback xmlns="" xmlns:mv="urn:schemas-microsoft-com:mac:vml" xmlns:c="http://schemas.openxmlformats.org/drawingml/2006/chart" xmlns:dgm="http://schemas.openxmlformats.org/drawingml/2006/diagram" xmlns:o="urn:schemas-microsoft-com:office:office" xmlns:v="urn:schemas-microsoft-com:vml" xmlns:pvml="urn:schemas-microsoft-com:office:powerpoint" xmlns:com="http://schemas.openxmlformats.org/drawingml/2006/compatibility" xmlns:p15="http://schemas.microsoft.com/office/powerpoint/2012/main" xmlns:ahyp="http://schemas.microsoft.com/office/drawing/2018/hyperlinkcolor">
+    <mc:Fallback xmlns:ahyp="http://schemas.microsoft.com/office/drawing/2018/hyperlinkcolor" xmlns:p15="http://schemas.microsoft.com/office/powerpoint/2012/main" xmlns:com="http://schemas.openxmlformats.org/drawingml/2006/compatibility" xmlns:pvml="urn:schemas-microsoft-com:office:powerpoint" xmlns:v="urn:schemas-microsoft-com:vml" xmlns:o="urn:schemas-microsoft-com:office:office" xmlns:dgm="http://schemas.openxmlformats.org/drawingml/2006/diagram" xmlns:c="http://schemas.openxmlformats.org/drawingml/2006/chart" xmlns:mv="urn:schemas-microsoft-com:mac:vml" xmlns="">
       <p:transition spd="med">
         <p:fade/>
       </p:transition>
@@ -11920,7 +11920,7 @@
         <p14:reveal/>
       </p:transition>
     </mc:Choice>
-    <mc:Fallback xmlns="" xmlns:mv="urn:schemas-microsoft-com:mac:vml" xmlns:c="http://schemas.openxmlformats.org/drawingml/2006/chart" xmlns:dgm="http://schemas.openxmlformats.org/drawingml/2006/diagram" xmlns:o="urn:schemas-microsoft-com:office:office" xmlns:v="urn:schemas-microsoft-com:vml" xmlns:pvml="urn:schemas-microsoft-com:office:powerpoint" xmlns:com="http://schemas.openxmlformats.org/drawingml/2006/compatibility" xmlns:p15="http://schemas.microsoft.com/office/powerpoint/2012/main" xmlns:ahyp="http://schemas.microsoft.com/office/drawing/2018/hyperlinkcolor">
+    <mc:Fallback xmlns:ahyp="http://schemas.microsoft.com/office/drawing/2018/hyperlinkcolor" xmlns:p15="http://schemas.microsoft.com/office/powerpoint/2012/main" xmlns:com="http://schemas.openxmlformats.org/drawingml/2006/compatibility" xmlns:pvml="urn:schemas-microsoft-com:office:powerpoint" xmlns:v="urn:schemas-microsoft-com:vml" xmlns:o="urn:schemas-microsoft-com:office:office" xmlns:dgm="http://schemas.openxmlformats.org/drawingml/2006/diagram" xmlns:c="http://schemas.openxmlformats.org/drawingml/2006/chart" xmlns:mv="urn:schemas-microsoft-com:mac:vml" xmlns="">
       <p:transition spd="med">
         <p:fade/>
       </p:transition>
@@ -12672,7 +12672,7 @@
         <p14:reveal/>
       </p:transition>
     </mc:Choice>
-    <mc:Fallback xmlns="" xmlns:mv="urn:schemas-microsoft-com:mac:vml" xmlns:c="http://schemas.openxmlformats.org/drawingml/2006/chart" xmlns:dgm="http://schemas.openxmlformats.org/drawingml/2006/diagram" xmlns:o="urn:schemas-microsoft-com:office:office" xmlns:v="urn:schemas-microsoft-com:vml" xmlns:pvml="urn:schemas-microsoft-com:office:powerpoint" xmlns:com="http://schemas.openxmlformats.org/drawingml/2006/compatibility" xmlns:p15="http://schemas.microsoft.com/office/powerpoint/2012/main" xmlns:ahyp="http://schemas.microsoft.com/office/drawing/2018/hyperlinkcolor">
+    <mc:Fallback xmlns:ahyp="http://schemas.microsoft.com/office/drawing/2018/hyperlinkcolor" xmlns:p15="http://schemas.microsoft.com/office/powerpoint/2012/main" xmlns:com="http://schemas.openxmlformats.org/drawingml/2006/compatibility" xmlns:pvml="urn:schemas-microsoft-com:office:powerpoint" xmlns:v="urn:schemas-microsoft-com:vml" xmlns:o="urn:schemas-microsoft-com:office:office" xmlns:dgm="http://schemas.openxmlformats.org/drawingml/2006/diagram" xmlns:c="http://schemas.openxmlformats.org/drawingml/2006/chart" xmlns:mv="urn:schemas-microsoft-com:mac:vml" xmlns="">
       <p:transition spd="med">
         <p:fade/>
       </p:transition>
@@ -13058,7 +13058,7 @@
         <p14:reveal/>
       </p:transition>
     </mc:Choice>
-    <mc:Fallback xmlns="" xmlns:mv="urn:schemas-microsoft-com:mac:vml" xmlns:c="http://schemas.openxmlformats.org/drawingml/2006/chart" xmlns:dgm="http://schemas.openxmlformats.org/drawingml/2006/diagram" xmlns:o="urn:schemas-microsoft-com:office:office" xmlns:v="urn:schemas-microsoft-com:vml" xmlns:pvml="urn:schemas-microsoft-com:office:powerpoint" xmlns:com="http://schemas.openxmlformats.org/drawingml/2006/compatibility" xmlns:p15="http://schemas.microsoft.com/office/powerpoint/2012/main" xmlns:ahyp="http://schemas.microsoft.com/office/drawing/2018/hyperlinkcolor">
+    <mc:Fallback xmlns:ahyp="http://schemas.microsoft.com/office/drawing/2018/hyperlinkcolor" xmlns:p15="http://schemas.microsoft.com/office/powerpoint/2012/main" xmlns:com="http://schemas.openxmlformats.org/drawingml/2006/compatibility" xmlns:pvml="urn:schemas-microsoft-com:office:powerpoint" xmlns:v="urn:schemas-microsoft-com:vml" xmlns:o="urn:schemas-microsoft-com:office:office" xmlns:dgm="http://schemas.openxmlformats.org/drawingml/2006/diagram" xmlns:c="http://schemas.openxmlformats.org/drawingml/2006/chart" xmlns:mv="urn:schemas-microsoft-com:mac:vml" xmlns="">
       <p:transition spd="med">
         <p:fade/>
       </p:transition>
@@ -13374,7 +13374,7 @@
         <p14:reveal/>
       </p:transition>
     </mc:Choice>
-    <mc:Fallback xmlns="" xmlns:mv="urn:schemas-microsoft-com:mac:vml" xmlns:c="http://schemas.openxmlformats.org/drawingml/2006/chart" xmlns:dgm="http://schemas.openxmlformats.org/drawingml/2006/diagram" xmlns:o="urn:schemas-microsoft-com:office:office" xmlns:v="urn:schemas-microsoft-com:vml" xmlns:pvml="urn:schemas-microsoft-com:office:powerpoint" xmlns:com="http://schemas.openxmlformats.org/drawingml/2006/compatibility" xmlns:p15="http://schemas.microsoft.com/office/powerpoint/2012/main" xmlns:ahyp="http://schemas.microsoft.com/office/drawing/2018/hyperlinkcolor">
+    <mc:Fallback xmlns:ahyp="http://schemas.microsoft.com/office/drawing/2018/hyperlinkcolor" xmlns:p15="http://schemas.microsoft.com/office/powerpoint/2012/main" xmlns:com="http://schemas.openxmlformats.org/drawingml/2006/compatibility" xmlns:pvml="urn:schemas-microsoft-com:office:powerpoint" xmlns:v="urn:schemas-microsoft-com:vml" xmlns:o="urn:schemas-microsoft-com:office:office" xmlns:dgm="http://schemas.openxmlformats.org/drawingml/2006/diagram" xmlns:c="http://schemas.openxmlformats.org/drawingml/2006/chart" xmlns:mv="urn:schemas-microsoft-com:mac:vml" xmlns="">
       <p:transition spd="med">
         <p:fade/>
       </p:transition>
@@ -13569,7 +13569,7 @@
         <p14:reveal/>
       </p:transition>
     </mc:Choice>
-    <mc:Fallback xmlns="" xmlns:mv="urn:schemas-microsoft-com:mac:vml" xmlns:c="http://schemas.openxmlformats.org/drawingml/2006/chart" xmlns:dgm="http://schemas.openxmlformats.org/drawingml/2006/diagram" xmlns:o="urn:schemas-microsoft-com:office:office" xmlns:v="urn:schemas-microsoft-com:vml" xmlns:pvml="urn:schemas-microsoft-com:office:powerpoint" xmlns:com="http://schemas.openxmlformats.org/drawingml/2006/compatibility" xmlns:p15="http://schemas.microsoft.com/office/powerpoint/2012/main" xmlns:ahyp="http://schemas.microsoft.com/office/drawing/2018/hyperlinkcolor">
+    <mc:Fallback xmlns:ahyp="http://schemas.microsoft.com/office/drawing/2018/hyperlinkcolor" xmlns:p15="http://schemas.microsoft.com/office/powerpoint/2012/main" xmlns:com="http://schemas.openxmlformats.org/drawingml/2006/compatibility" xmlns:pvml="urn:schemas-microsoft-com:office:powerpoint" xmlns:v="urn:schemas-microsoft-com:vml" xmlns:o="urn:schemas-microsoft-com:office:office" xmlns:dgm="http://schemas.openxmlformats.org/drawingml/2006/diagram" xmlns:c="http://schemas.openxmlformats.org/drawingml/2006/chart" xmlns:mv="urn:schemas-microsoft-com:mac:vml" xmlns="">
       <p:transition spd="med">
         <p:fade/>
       </p:transition>
@@ -14003,7 +14003,7 @@
         <p14:reveal/>
       </p:transition>
     </mc:Choice>
-    <mc:Fallback xmlns="" xmlns:mv="urn:schemas-microsoft-com:mac:vml" xmlns:c="http://schemas.openxmlformats.org/drawingml/2006/chart" xmlns:dgm="http://schemas.openxmlformats.org/drawingml/2006/diagram" xmlns:o="urn:schemas-microsoft-com:office:office" xmlns:v="urn:schemas-microsoft-com:vml" xmlns:pvml="urn:schemas-microsoft-com:office:powerpoint" xmlns:com="http://schemas.openxmlformats.org/drawingml/2006/compatibility" xmlns:p15="http://schemas.microsoft.com/office/powerpoint/2012/main" xmlns:ahyp="http://schemas.microsoft.com/office/drawing/2018/hyperlinkcolor">
+    <mc:Fallback xmlns:ahyp="http://schemas.microsoft.com/office/drawing/2018/hyperlinkcolor" xmlns:p15="http://schemas.microsoft.com/office/powerpoint/2012/main" xmlns:com="http://schemas.openxmlformats.org/drawingml/2006/compatibility" xmlns:pvml="urn:schemas-microsoft-com:office:powerpoint" xmlns:v="urn:schemas-microsoft-com:vml" xmlns:o="urn:schemas-microsoft-com:office:office" xmlns:dgm="http://schemas.openxmlformats.org/drawingml/2006/diagram" xmlns:c="http://schemas.openxmlformats.org/drawingml/2006/chart" xmlns:mv="urn:schemas-microsoft-com:mac:vml" xmlns="">
       <p:transition spd="med">
         <p:fade/>
       </p:transition>
@@ -14803,7 +14803,7 @@
         <p14:reveal/>
       </p:transition>
     </mc:Choice>
-    <mc:Fallback xmlns="" xmlns:mv="urn:schemas-microsoft-com:mac:vml" xmlns:c="http://schemas.openxmlformats.org/drawingml/2006/chart" xmlns:dgm="http://schemas.openxmlformats.org/drawingml/2006/diagram" xmlns:o="urn:schemas-microsoft-com:office:office" xmlns:v="urn:schemas-microsoft-com:vml" xmlns:pvml="urn:schemas-microsoft-com:office:powerpoint" xmlns:com="http://schemas.openxmlformats.org/drawingml/2006/compatibility" xmlns:p15="http://schemas.microsoft.com/office/powerpoint/2012/main" xmlns:ahyp="http://schemas.microsoft.com/office/drawing/2018/hyperlinkcolor">
+    <mc:Fallback xmlns:ahyp="http://schemas.microsoft.com/office/drawing/2018/hyperlinkcolor" xmlns:p15="http://schemas.microsoft.com/office/powerpoint/2012/main" xmlns:com="http://schemas.openxmlformats.org/drawingml/2006/compatibility" xmlns:pvml="urn:schemas-microsoft-com:office:powerpoint" xmlns:v="urn:schemas-microsoft-com:vml" xmlns:o="urn:schemas-microsoft-com:office:office" xmlns:dgm="http://schemas.openxmlformats.org/drawingml/2006/diagram" xmlns:c="http://schemas.openxmlformats.org/drawingml/2006/chart" xmlns:mv="urn:schemas-microsoft-com:mac:vml" xmlns="">
       <p:transition spd="med">
         <p:fade/>
       </p:transition>
@@ -14992,7 +14992,7 @@
         <p14:reveal/>
       </p:transition>
     </mc:Choice>
-    <mc:Fallback xmlns="" xmlns:mv="urn:schemas-microsoft-com:mac:vml" xmlns:c="http://schemas.openxmlformats.org/drawingml/2006/chart" xmlns:dgm="http://schemas.openxmlformats.org/drawingml/2006/diagram" xmlns:o="urn:schemas-microsoft-com:office:office" xmlns:v="urn:schemas-microsoft-com:vml" xmlns:pvml="urn:schemas-microsoft-com:office:powerpoint" xmlns:com="http://schemas.openxmlformats.org/drawingml/2006/compatibility" xmlns:p15="http://schemas.microsoft.com/office/powerpoint/2012/main" xmlns:ahyp="http://schemas.microsoft.com/office/drawing/2018/hyperlinkcolor">
+    <mc:Fallback xmlns:ahyp="http://schemas.microsoft.com/office/drawing/2018/hyperlinkcolor" xmlns:p15="http://schemas.microsoft.com/office/powerpoint/2012/main" xmlns:com="http://schemas.openxmlformats.org/drawingml/2006/compatibility" xmlns:pvml="urn:schemas-microsoft-com:office:powerpoint" xmlns:v="urn:schemas-microsoft-com:vml" xmlns:o="urn:schemas-microsoft-com:office:office" xmlns:dgm="http://schemas.openxmlformats.org/drawingml/2006/diagram" xmlns:c="http://schemas.openxmlformats.org/drawingml/2006/chart" xmlns:mv="urn:schemas-microsoft-com:mac:vml" xmlns="">
       <p:transition spd="med">
         <p:fade/>
       </p:transition>
@@ -15151,7 +15151,7 @@
         <p14:reveal/>
       </p:transition>
     </mc:Choice>
-    <mc:Fallback xmlns="" xmlns:mv="urn:schemas-microsoft-com:mac:vml" xmlns:c="http://schemas.openxmlformats.org/drawingml/2006/chart" xmlns:dgm="http://schemas.openxmlformats.org/drawingml/2006/diagram" xmlns:o="urn:schemas-microsoft-com:office:office" xmlns:v="urn:schemas-microsoft-com:vml" xmlns:pvml="urn:schemas-microsoft-com:office:powerpoint" xmlns:com="http://schemas.openxmlformats.org/drawingml/2006/compatibility" xmlns:p15="http://schemas.microsoft.com/office/powerpoint/2012/main" xmlns:ahyp="http://schemas.microsoft.com/office/drawing/2018/hyperlinkcolor">
+    <mc:Fallback xmlns:ahyp="http://schemas.microsoft.com/office/drawing/2018/hyperlinkcolor" xmlns:p15="http://schemas.microsoft.com/office/powerpoint/2012/main" xmlns:com="http://schemas.openxmlformats.org/drawingml/2006/compatibility" xmlns:pvml="urn:schemas-microsoft-com:office:powerpoint" xmlns:v="urn:schemas-microsoft-com:vml" xmlns:o="urn:schemas-microsoft-com:office:office" xmlns:dgm="http://schemas.openxmlformats.org/drawingml/2006/diagram" xmlns:c="http://schemas.openxmlformats.org/drawingml/2006/chart" xmlns:mv="urn:schemas-microsoft-com:mac:vml" xmlns="">
       <p:transition spd="med">
         <p:fade/>
       </p:transition>
@@ -16598,7 +16598,7 @@
         <p14:reveal/>
       </p:transition>
     </mc:Choice>
-    <mc:Fallback xmlns="" xmlns:mv="urn:schemas-microsoft-com:mac:vml" xmlns:c="http://schemas.openxmlformats.org/drawingml/2006/chart" xmlns:dgm="http://schemas.openxmlformats.org/drawingml/2006/diagram" xmlns:o="urn:schemas-microsoft-com:office:office" xmlns:v="urn:schemas-microsoft-com:vml" xmlns:pvml="urn:schemas-microsoft-com:office:powerpoint" xmlns:com="http://schemas.openxmlformats.org/drawingml/2006/compatibility" xmlns:p15="http://schemas.microsoft.com/office/powerpoint/2012/main" xmlns:ahyp="http://schemas.microsoft.com/office/drawing/2018/hyperlinkcolor">
+    <mc:Fallback xmlns:ahyp="http://schemas.microsoft.com/office/drawing/2018/hyperlinkcolor" xmlns:p15="http://schemas.microsoft.com/office/powerpoint/2012/main" xmlns:com="http://schemas.openxmlformats.org/drawingml/2006/compatibility" xmlns:pvml="urn:schemas-microsoft-com:office:powerpoint" xmlns:v="urn:schemas-microsoft-com:vml" xmlns:o="urn:schemas-microsoft-com:office:office" xmlns:dgm="http://schemas.openxmlformats.org/drawingml/2006/diagram" xmlns:c="http://schemas.openxmlformats.org/drawingml/2006/chart" xmlns:mv="urn:schemas-microsoft-com:mac:vml" xmlns="">
       <p:transition spd="med">
         <p:fade/>
       </p:transition>
@@ -16755,7 +16755,7 @@
         <p14:reveal/>
       </p:transition>
     </mc:Choice>
-    <mc:Fallback xmlns="" xmlns:mv="urn:schemas-microsoft-com:mac:vml" xmlns:c="http://schemas.openxmlformats.org/drawingml/2006/chart" xmlns:dgm="http://schemas.openxmlformats.org/drawingml/2006/diagram" xmlns:o="urn:schemas-microsoft-com:office:office" xmlns:v="urn:schemas-microsoft-com:vml" xmlns:pvml="urn:schemas-microsoft-com:office:powerpoint" xmlns:com="http://schemas.openxmlformats.org/drawingml/2006/compatibility" xmlns:p15="http://schemas.microsoft.com/office/powerpoint/2012/main" xmlns:ahyp="http://schemas.microsoft.com/office/drawing/2018/hyperlinkcolor">
+    <mc:Fallback xmlns:ahyp="http://schemas.microsoft.com/office/drawing/2018/hyperlinkcolor" xmlns:p15="http://schemas.microsoft.com/office/powerpoint/2012/main" xmlns:com="http://schemas.openxmlformats.org/drawingml/2006/compatibility" xmlns:pvml="urn:schemas-microsoft-com:office:powerpoint" xmlns:v="urn:schemas-microsoft-com:vml" xmlns:o="urn:schemas-microsoft-com:office:office" xmlns:dgm="http://schemas.openxmlformats.org/drawingml/2006/diagram" xmlns:c="http://schemas.openxmlformats.org/drawingml/2006/chart" xmlns:mv="urn:schemas-microsoft-com:mac:vml" xmlns="">
       <p:transition spd="med">
         <p:fade/>
       </p:transition>
@@ -17138,7 +17138,7 @@
         <p14:reveal/>
       </p:transition>
     </mc:Choice>
-    <mc:Fallback xmlns="" xmlns:mv="urn:schemas-microsoft-com:mac:vml" xmlns:c="http://schemas.openxmlformats.org/drawingml/2006/chart" xmlns:dgm="http://schemas.openxmlformats.org/drawingml/2006/diagram" xmlns:o="urn:schemas-microsoft-com:office:office" xmlns:v="urn:schemas-microsoft-com:vml" xmlns:pvml="urn:schemas-microsoft-com:office:powerpoint" xmlns:com="http://schemas.openxmlformats.org/drawingml/2006/compatibility" xmlns:p15="http://schemas.microsoft.com/office/powerpoint/2012/main" xmlns:ahyp="http://schemas.microsoft.com/office/drawing/2018/hyperlinkcolor">
+    <mc:Fallback xmlns:ahyp="http://schemas.microsoft.com/office/drawing/2018/hyperlinkcolor" xmlns:p15="http://schemas.microsoft.com/office/powerpoint/2012/main" xmlns:com="http://schemas.openxmlformats.org/drawingml/2006/compatibility" xmlns:pvml="urn:schemas-microsoft-com:office:powerpoint" xmlns:v="urn:schemas-microsoft-com:vml" xmlns:o="urn:schemas-microsoft-com:office:office" xmlns:dgm="http://schemas.openxmlformats.org/drawingml/2006/diagram" xmlns:c="http://schemas.openxmlformats.org/drawingml/2006/chart" xmlns:mv="urn:schemas-microsoft-com:mac:vml" xmlns="">
       <p:transition spd="med">
         <p:fade/>
       </p:transition>
@@ -17210,7 +17210,7 @@
         <p14:reveal/>
       </p:transition>
     </mc:Choice>
-    <mc:Fallback xmlns="" xmlns:mv="urn:schemas-microsoft-com:mac:vml" xmlns:c="http://schemas.openxmlformats.org/drawingml/2006/chart" xmlns:dgm="http://schemas.openxmlformats.org/drawingml/2006/diagram" xmlns:o="urn:schemas-microsoft-com:office:office" xmlns:v="urn:schemas-microsoft-com:vml" xmlns:pvml="urn:schemas-microsoft-com:office:powerpoint" xmlns:com="http://schemas.openxmlformats.org/drawingml/2006/compatibility" xmlns:p15="http://schemas.microsoft.com/office/powerpoint/2012/main" xmlns:ahyp="http://schemas.microsoft.com/office/drawing/2018/hyperlinkcolor">
+    <mc:Fallback xmlns:ahyp="http://schemas.microsoft.com/office/drawing/2018/hyperlinkcolor" xmlns:p15="http://schemas.microsoft.com/office/powerpoint/2012/main" xmlns:com="http://schemas.openxmlformats.org/drawingml/2006/compatibility" xmlns:pvml="urn:schemas-microsoft-com:office:powerpoint" xmlns:v="urn:schemas-microsoft-com:vml" xmlns:o="urn:schemas-microsoft-com:office:office" xmlns:dgm="http://schemas.openxmlformats.org/drawingml/2006/diagram" xmlns:c="http://schemas.openxmlformats.org/drawingml/2006/chart" xmlns:mv="urn:schemas-microsoft-com:mac:vml" xmlns="">
       <p:transition spd="med">
         <p:fade/>
       </p:transition>
@@ -17804,7 +17804,7 @@
         <p14:reveal/>
       </p:transition>
     </mc:Choice>
-    <mc:Fallback xmlns="" xmlns:mv="urn:schemas-microsoft-com:mac:vml" xmlns:c="http://schemas.openxmlformats.org/drawingml/2006/chart" xmlns:dgm="http://schemas.openxmlformats.org/drawingml/2006/diagram" xmlns:o="urn:schemas-microsoft-com:office:office" xmlns:v="urn:schemas-microsoft-com:vml" xmlns:pvml="urn:schemas-microsoft-com:office:powerpoint" xmlns:com="http://schemas.openxmlformats.org/drawingml/2006/compatibility" xmlns:p15="http://schemas.microsoft.com/office/powerpoint/2012/main" xmlns:ahyp="http://schemas.microsoft.com/office/drawing/2018/hyperlinkcolor">
+    <mc:Fallback xmlns:ahyp="http://schemas.microsoft.com/office/drawing/2018/hyperlinkcolor" xmlns:p15="http://schemas.microsoft.com/office/powerpoint/2012/main" xmlns:com="http://schemas.openxmlformats.org/drawingml/2006/compatibility" xmlns:pvml="urn:schemas-microsoft-com:office:powerpoint" xmlns:v="urn:schemas-microsoft-com:vml" xmlns:o="urn:schemas-microsoft-com:office:office" xmlns:dgm="http://schemas.openxmlformats.org/drawingml/2006/diagram" xmlns:c="http://schemas.openxmlformats.org/drawingml/2006/chart" xmlns:mv="urn:schemas-microsoft-com:mac:vml" xmlns="">
       <p:transition spd="med">
         <p:fade/>
       </p:transition>
@@ -18477,7 +18477,7 @@
         <p14:reveal/>
       </p:transition>
     </mc:Choice>
-    <mc:Fallback xmlns="" xmlns:mv="urn:schemas-microsoft-com:mac:vml" xmlns:c="http://schemas.openxmlformats.org/drawingml/2006/chart" xmlns:dgm="http://schemas.openxmlformats.org/drawingml/2006/diagram" xmlns:o="urn:schemas-microsoft-com:office:office" xmlns:v="urn:schemas-microsoft-com:vml" xmlns:pvml="urn:schemas-microsoft-com:office:powerpoint" xmlns:com="http://schemas.openxmlformats.org/drawingml/2006/compatibility" xmlns:p15="http://schemas.microsoft.com/office/powerpoint/2012/main" xmlns:ahyp="http://schemas.microsoft.com/office/drawing/2018/hyperlinkcolor">
+    <mc:Fallback xmlns:ahyp="http://schemas.microsoft.com/office/drawing/2018/hyperlinkcolor" xmlns:p15="http://schemas.microsoft.com/office/powerpoint/2012/main" xmlns:com="http://schemas.openxmlformats.org/drawingml/2006/compatibility" xmlns:pvml="urn:schemas-microsoft-com:office:powerpoint" xmlns:v="urn:schemas-microsoft-com:vml" xmlns:o="urn:schemas-microsoft-com:office:office" xmlns:dgm="http://schemas.openxmlformats.org/drawingml/2006/diagram" xmlns:c="http://schemas.openxmlformats.org/drawingml/2006/chart" xmlns:mv="urn:schemas-microsoft-com:mac:vml" xmlns="">
       <p:transition spd="med">
         <p:fade/>
       </p:transition>
@@ -20127,7 +20127,7 @@
         <p14:reveal/>
       </p:transition>
     </mc:Choice>
-    <mc:Fallback xmlns="" xmlns:mv="urn:schemas-microsoft-com:mac:vml" xmlns:c="http://schemas.openxmlformats.org/drawingml/2006/chart" xmlns:dgm="http://schemas.openxmlformats.org/drawingml/2006/diagram" xmlns:o="urn:schemas-microsoft-com:office:office" xmlns:v="urn:schemas-microsoft-com:vml" xmlns:pvml="urn:schemas-microsoft-com:office:powerpoint" xmlns:com="http://schemas.openxmlformats.org/drawingml/2006/compatibility" xmlns:p15="http://schemas.microsoft.com/office/powerpoint/2012/main" xmlns:ahyp="http://schemas.microsoft.com/office/drawing/2018/hyperlinkcolor">
+    <mc:Fallback xmlns:ahyp="http://schemas.microsoft.com/office/drawing/2018/hyperlinkcolor" xmlns:p15="http://schemas.microsoft.com/office/powerpoint/2012/main" xmlns:com="http://schemas.openxmlformats.org/drawingml/2006/compatibility" xmlns:pvml="urn:schemas-microsoft-com:office:powerpoint" xmlns:v="urn:schemas-microsoft-com:vml" xmlns:o="urn:schemas-microsoft-com:office:office" xmlns:dgm="http://schemas.openxmlformats.org/drawingml/2006/diagram" xmlns:c="http://schemas.openxmlformats.org/drawingml/2006/chart" xmlns:mv="urn:schemas-microsoft-com:mac:vml" xmlns="">
       <p:transition spd="med">
         <p:fade/>
       </p:transition>
@@ -23505,7 +23505,7 @@
         <p14:reveal/>
       </p:transition>
     </mc:Choice>
-    <mc:Fallback xmlns="" xmlns:mv="urn:schemas-microsoft-com:mac:vml" xmlns:c="http://schemas.openxmlformats.org/drawingml/2006/chart" xmlns:dgm="http://schemas.openxmlformats.org/drawingml/2006/diagram" xmlns:o="urn:schemas-microsoft-com:office:office" xmlns:v="urn:schemas-microsoft-com:vml" xmlns:pvml="urn:schemas-microsoft-com:office:powerpoint" xmlns:com="http://schemas.openxmlformats.org/drawingml/2006/compatibility" xmlns:p15="http://schemas.microsoft.com/office/powerpoint/2012/main" xmlns:ahyp="http://schemas.microsoft.com/office/drawing/2018/hyperlinkcolor">
+    <mc:Fallback xmlns:ahyp="http://schemas.microsoft.com/office/drawing/2018/hyperlinkcolor" xmlns:p15="http://schemas.microsoft.com/office/powerpoint/2012/main" xmlns:com="http://schemas.openxmlformats.org/drawingml/2006/compatibility" xmlns:pvml="urn:schemas-microsoft-com:office:powerpoint" xmlns:v="urn:schemas-microsoft-com:vml" xmlns:o="urn:schemas-microsoft-com:office:office" xmlns:dgm="http://schemas.openxmlformats.org/drawingml/2006/diagram" xmlns:c="http://schemas.openxmlformats.org/drawingml/2006/chart" xmlns:mv="urn:schemas-microsoft-com:mac:vml" xmlns="">
       <p:transition spd="med">
         <p:fade/>
       </p:transition>
@@ -24885,7 +24885,7 @@
         <p14:reveal/>
       </p:transition>
     </mc:Choice>
-    <mc:Fallback xmlns="" xmlns:mv="urn:schemas-microsoft-com:mac:vml" xmlns:c="http://schemas.openxmlformats.org/drawingml/2006/chart" xmlns:dgm="http://schemas.openxmlformats.org/drawingml/2006/diagram" xmlns:o="urn:schemas-microsoft-com:office:office" xmlns:v="urn:schemas-microsoft-com:vml" xmlns:pvml="urn:schemas-microsoft-com:office:powerpoint" xmlns:com="http://schemas.openxmlformats.org/drawingml/2006/compatibility" xmlns:p15="http://schemas.microsoft.com/office/powerpoint/2012/main" xmlns:ahyp="http://schemas.microsoft.com/office/drawing/2018/hyperlinkcolor">
+    <mc:Fallback xmlns:ahyp="http://schemas.microsoft.com/office/drawing/2018/hyperlinkcolor" xmlns:p15="http://schemas.microsoft.com/office/powerpoint/2012/main" xmlns:com="http://schemas.openxmlformats.org/drawingml/2006/compatibility" xmlns:pvml="urn:schemas-microsoft-com:office:powerpoint" xmlns:v="urn:schemas-microsoft-com:vml" xmlns:o="urn:schemas-microsoft-com:office:office" xmlns:dgm="http://schemas.openxmlformats.org/drawingml/2006/diagram" xmlns:c="http://schemas.openxmlformats.org/drawingml/2006/chart" xmlns:mv="urn:schemas-microsoft-com:mac:vml" xmlns="">
       <p:transition spd="med">
         <p:fade/>
       </p:transition>
@@ -25264,13 +25264,13 @@
   <p:clrMapOvr>
     <a:masterClrMapping/>
   </p:clrMapOvr>
-  <mc:AlternateContent xmlns:mc="http://schemas.openxmlformats.org/markup-compatibility/2006">
-    <mc:Choice xmlns:p14="http://schemas.microsoft.com/office/powerpoint/2010/main" Requires="p14">
+  <mc:AlternateContent xmlns:mc="http://schemas.openxmlformats.org/markup-compatibility/2006" xmlns:p14="http://schemas.microsoft.com/office/powerpoint/2010/main">
+    <mc:Choice Requires="p14">
       <p:transition spd="slow">
         <p14:reveal/>
       </p:transition>
     </mc:Choice>
-    <mc:Fallback>
+    <mc:Fallback xmlns="">
       <p:transition spd="slow">
         <p:fade/>
       </p:transition>
@@ -26230,7 +26230,7 @@
             </a:r>
             <a:r>
               <a:rPr lang="fr-BE" sz="2800"/>
-              <a:t>afin que, malgré qu'il y ait deux objets (?), le dictionnaire soit unique.</a:t>
+              <a:t>afin que le dictionnaire soit unique.</a:t>
             </a:r>
           </a:p>
           <a:p>
@@ -26292,6 +26292,19 @@
               </a:rPr>
               <a:t>append( key, value )</a:t>
             </a:r>
+          </a:p>
+          <a:p>
+            <a:pPr marL="482600" lvl="1" indent="0">
+              <a:buNone/>
+            </a:pPr>
+            <a:br>
+              <a:rPr lang="fr-BE" sz="2400" b="1">
+                <a:solidFill>
+                  <a:srgbClr val="A87236"/>
+                </a:solidFill>
+                <a:latin typeface="Courier New" panose="02070309020205020404" pitchFamily="49" charset="0"/>
+              </a:rPr>
+            </a:br>
             <a:endParaRPr lang="fr-BE" sz="2800" b="1">
               <a:solidFill>
                 <a:srgbClr val="A87236"/>
@@ -26692,7 +26705,7 @@
         </p:spPr>
         <p:txBody>
           <a:bodyPr numCol="1" spcCol="360000">
-            <a:normAutofit fontScale="85000" lnSpcReduction="20000"/>
+            <a:normAutofit fontScale="92500" lnSpcReduction="20000"/>
           </a:bodyPr>
           <a:lstStyle/>
           <a:p>
@@ -26791,7 +26804,25 @@
                 </a:solidFill>
                 <a:latin typeface="Courier New" panose="02070309020205020404" pitchFamily="49" charset="0"/>
               </a:rPr>
-              <a:t>    if Storage.__instance is None:</a:t>
+              <a:t>    if </a:t>
+            </a:r>
+            <a:r>
+              <a:rPr lang="en-US" sz="2800" b="1">
+                <a:solidFill>
+                  <a:schemeClr val="accent5"/>
+                </a:solidFill>
+                <a:latin typeface="Courier New" panose="02070309020205020404" pitchFamily="49" charset="0"/>
+              </a:rPr>
+              <a:t>Storage</a:t>
+            </a:r>
+            <a:r>
+              <a:rPr lang="en-US" sz="2800" b="1">
+                <a:solidFill>
+                  <a:schemeClr val="accent2"/>
+                </a:solidFill>
+                <a:latin typeface="Courier New" panose="02070309020205020404" pitchFamily="49" charset="0"/>
+              </a:rPr>
+              <a:t>.__instance is None:</a:t>
             </a:r>
           </a:p>
           <a:p>
@@ -26828,11 +26859,20 @@
             <a:r>
               <a:rPr lang="en-US" sz="2800" b="1">
                 <a:solidFill>
+                  <a:schemeClr val="accent5"/>
+                </a:solidFill>
+                <a:latin typeface="Courier New" panose="02070309020205020404" pitchFamily="49" charset="0"/>
+              </a:rPr>
+              <a:t>Storage</a:t>
+            </a:r>
+            <a:r>
+              <a:rPr lang="en-US" sz="2800" b="1">
+                <a:solidFill>
                   <a:schemeClr val="accent2"/>
                 </a:solidFill>
                 <a:latin typeface="Courier New" panose="02070309020205020404" pitchFamily="49" charset="0"/>
               </a:rPr>
-              <a:t>Storage.__instance = </a:t>
+              <a:t>.__instance = </a:t>
             </a:r>
             <a:r>
               <a:rPr lang="en-US" sz="2800" b="1">
@@ -26871,7 +26911,25 @@
                 </a:solidFill>
                 <a:latin typeface="Courier New" panose="02070309020205020404" pitchFamily="49" charset="0"/>
               </a:rPr>
-              <a:t>    return Storage.__instance </a:t>
+              <a:t>    return </a:t>
+            </a:r>
+            <a:r>
+              <a:rPr lang="en-US" sz="2800" b="1">
+                <a:solidFill>
+                  <a:schemeClr val="accent5"/>
+                </a:solidFill>
+                <a:latin typeface="Courier New" panose="02070309020205020404" pitchFamily="49" charset="0"/>
+              </a:rPr>
+              <a:t>Storage</a:t>
+            </a:r>
+            <a:r>
+              <a:rPr lang="en-US" sz="2800" b="1">
+                <a:solidFill>
+                  <a:schemeClr val="accent2"/>
+                </a:solidFill>
+                <a:latin typeface="Courier New" panose="02070309020205020404" pitchFamily="49" charset="0"/>
+              </a:rPr>
+              <a:t>.__instance </a:t>
             </a:r>
           </a:p>
           <a:p>
@@ -26896,25 +26954,16 @@
                 </a:solidFill>
                 <a:latin typeface="Courier New" panose="02070309020205020404" pitchFamily="49" charset="0"/>
               </a:rPr>
-              <a:t>  def </a:t>
-            </a:r>
-            <a:r>
-              <a:rPr lang="en-US" sz="2800" b="1">
-                <a:solidFill>
-                  <a:schemeClr val="accent5"/>
-                </a:solidFill>
-                <a:latin typeface="Courier New" panose="02070309020205020404" pitchFamily="49" charset="0"/>
-              </a:rPr>
-              <a:t>__init__</a:t>
-            </a:r>
-            <a:r>
-              <a:rPr lang="en-US" sz="2800" b="1">
+              <a:t>  def __init__(</a:t>
+            </a:r>
+            <a:r>
+              <a:rPr lang="en-US" sz="2800" b="1" dirty="0">
                 <a:solidFill>
                   <a:srgbClr val="A87236"/>
                 </a:solidFill>
                 <a:latin typeface="Courier New" panose="02070309020205020404" pitchFamily="49" charset="0"/>
               </a:rPr>
-              <a:t>(self):</a:t>
+              <a:t>self):</a:t>
             </a:r>
           </a:p>
           <a:p>
@@ -26930,7 +26979,18 @@
                 </a:solidFill>
                 <a:latin typeface="Courier New" panose="02070309020205020404" pitchFamily="49" charset="0"/>
               </a:rPr>
-              <a:t>    # If instance already exists, then exception</a:t>
+              <a:t>    </a:t>
+            </a:r>
+            <a:r>
+              <a:rPr lang="en-US" sz="2800" b="1" dirty="0">
+                <a:solidFill>
+                  <a:schemeClr val="bg1">
+                    <a:lumMod val="50000"/>
+                  </a:schemeClr>
+                </a:solidFill>
+                <a:latin typeface="Courier New" panose="02070309020205020404" pitchFamily="49" charset="0"/>
+              </a:rPr>
+              <a:t># If instance already exists, then exception</a:t>
             </a:r>
           </a:p>
           <a:p>
@@ -26944,7 +27004,34 @@
                 </a:solidFill>
                 <a:latin typeface="Courier New" panose="02070309020205020404" pitchFamily="49" charset="0"/>
               </a:rPr>
-              <a:t>    if Storage.__instance is not None:</a:t>
+              <a:t>    if self.__instance</a:t>
+            </a:r>
+            <a:r>
+              <a:rPr lang="en-US" sz="2800" b="1" dirty="0">
+                <a:solidFill>
+                  <a:schemeClr val="accent2"/>
+                </a:solidFill>
+                <a:latin typeface="Courier New" panose="02070309020205020404" pitchFamily="49" charset="0"/>
+              </a:rPr>
+              <a:t> </a:t>
+            </a:r>
+            <a:r>
+              <a:rPr lang="en-US" sz="2800" b="1">
+                <a:solidFill>
+                  <a:schemeClr val="accent2"/>
+                </a:solidFill>
+                <a:latin typeface="Courier New" panose="02070309020205020404" pitchFamily="49" charset="0"/>
+              </a:rPr>
+              <a:t>is </a:t>
+            </a:r>
+            <a:r>
+              <a:rPr lang="en-US" sz="2800" b="1" dirty="0">
+                <a:solidFill>
+                  <a:schemeClr val="accent2"/>
+                </a:solidFill>
+                <a:latin typeface="Courier New" panose="02070309020205020404" pitchFamily="49" charset="0"/>
+              </a:rPr>
+              <a:t>not None:</a:t>
             </a:r>
           </a:p>
           <a:p>
@@ -26952,7 +27039,7 @@
               <a:buNone/>
             </a:pPr>
             <a:r>
-              <a:rPr lang="en-US" sz="2800" b="1">
+              <a:rPr lang="en-US" sz="2800" b="1" dirty="0">
                 <a:solidFill>
                   <a:schemeClr val="accent2"/>
                 </a:solidFill>
@@ -26965,42 +27052,12 @@
             <a:pPr marL="82800" indent="0">
               <a:buNone/>
             </a:pPr>
-            <a:endParaRPr lang="en-US" sz="2800" b="1">
+            <a:endParaRPr lang="en-US" sz="2800" b="1" dirty="0">
               <a:solidFill>
                 <a:srgbClr val="A87236"/>
               </a:solidFill>
               <a:latin typeface="Courier New" panose="02070309020205020404" pitchFamily="49" charset="0"/>
             </a:endParaRPr>
-          </a:p>
-          <a:p>
-            <a:pPr marL="82800" indent="0">
-              <a:buNone/>
-            </a:pPr>
-            <a:r>
-              <a:rPr lang="en-US" sz="2800" b="1">
-                <a:solidFill>
-                  <a:schemeClr val="bg1">
-                    <a:lumMod val="50000"/>
-                  </a:schemeClr>
-                </a:solidFill>
-                <a:latin typeface="Courier New" panose="02070309020205020404" pitchFamily="49" charset="0"/>
-              </a:rPr>
-              <a:t>    # Sequel of the constructor</a:t>
-            </a:r>
-          </a:p>
-          <a:p>
-            <a:pPr marL="82800" indent="0">
-              <a:buNone/>
-            </a:pPr>
-            <a:r>
-              <a:rPr lang="en-US" sz="2800" b="1">
-                <a:solidFill>
-                  <a:srgbClr val="A87236"/>
-                </a:solidFill>
-                <a:latin typeface="Courier New" panose="02070309020205020404" pitchFamily="49" charset="0"/>
-              </a:rPr>
-              <a:t>    ... ...</a:t>
-            </a:r>
           </a:p>
         </p:txBody>
       </p:sp>
@@ -27098,7 +27155,7 @@
         </p:spPr>
         <p:txBody>
           <a:bodyPr numCol="1" spcCol="360000">
-            <a:normAutofit fontScale="85000" lnSpcReduction="20000"/>
+            <a:normAutofit fontScale="92500" lnSpcReduction="20000"/>
           </a:bodyPr>
           <a:lstStyle/>
           <a:p>
@@ -27197,7 +27254,25 @@
                 </a:solidFill>
                 <a:latin typeface="Courier New" panose="02070309020205020404" pitchFamily="49" charset="0"/>
               </a:rPr>
-              <a:t>    if cls.__instance is None:</a:t>
+              <a:t>    if </a:t>
+            </a:r>
+            <a:r>
+              <a:rPr lang="en-US" sz="2800" b="1">
+                <a:solidFill>
+                  <a:schemeClr val="accent5"/>
+                </a:solidFill>
+                <a:latin typeface="Courier New" panose="02070309020205020404" pitchFamily="49" charset="0"/>
+              </a:rPr>
+              <a:t>cls</a:t>
+            </a:r>
+            <a:r>
+              <a:rPr lang="en-US" sz="2800" b="1">
+                <a:solidFill>
+                  <a:schemeClr val="accent2"/>
+                </a:solidFill>
+                <a:latin typeface="Courier New" panose="02070309020205020404" pitchFamily="49" charset="0"/>
+              </a:rPr>
+              <a:t>.__instance is None:</a:t>
             </a:r>
           </a:p>
           <a:p>
@@ -27234,11 +27309,20 @@
             <a:r>
               <a:rPr lang="en-US" sz="2800" b="1">
                 <a:solidFill>
+                  <a:schemeClr val="accent5"/>
+                </a:solidFill>
+                <a:latin typeface="Courier New" panose="02070309020205020404" pitchFamily="49" charset="0"/>
+              </a:rPr>
+              <a:t>cls</a:t>
+            </a:r>
+            <a:r>
+              <a:rPr lang="en-US" sz="2800" b="1">
+                <a:solidFill>
                   <a:schemeClr val="accent2"/>
                 </a:solidFill>
                 <a:latin typeface="Courier New" panose="02070309020205020404" pitchFamily="49" charset="0"/>
               </a:rPr>
-              <a:t>cls.__instance = </a:t>
+              <a:t>.__instance = </a:t>
             </a:r>
             <a:r>
               <a:rPr lang="en-US" sz="2800" b="1">
@@ -27277,7 +27361,25 @@
                 </a:solidFill>
                 <a:latin typeface="Courier New" panose="02070309020205020404" pitchFamily="49" charset="0"/>
               </a:rPr>
-              <a:t>    return cls.__instance </a:t>
+              <a:t>    return </a:t>
+            </a:r>
+            <a:r>
+              <a:rPr lang="en-US" sz="2800" b="1">
+                <a:solidFill>
+                  <a:schemeClr val="accent5"/>
+                </a:solidFill>
+                <a:latin typeface="Courier New" panose="02070309020205020404" pitchFamily="49" charset="0"/>
+              </a:rPr>
+              <a:t>cls</a:t>
+            </a:r>
+            <a:r>
+              <a:rPr lang="en-US" sz="2800" b="1">
+                <a:solidFill>
+                  <a:schemeClr val="accent2"/>
+                </a:solidFill>
+                <a:latin typeface="Courier New" panose="02070309020205020404" pitchFamily="49" charset="0"/>
+              </a:rPr>
+              <a:t>.__instance </a:t>
             </a:r>
           </a:p>
           <a:p>
@@ -27302,25 +27404,7 @@
                 </a:solidFill>
                 <a:latin typeface="Courier New" panose="02070309020205020404" pitchFamily="49" charset="0"/>
               </a:rPr>
-              <a:t>  def </a:t>
-            </a:r>
-            <a:r>
-              <a:rPr lang="en-US" sz="2800" b="1">
-                <a:solidFill>
-                  <a:schemeClr val="accent5"/>
-                </a:solidFill>
-                <a:latin typeface="Courier New" panose="02070309020205020404" pitchFamily="49" charset="0"/>
-              </a:rPr>
-              <a:t>__init__</a:t>
-            </a:r>
-            <a:r>
-              <a:rPr lang="en-US" sz="2800" b="1">
-                <a:solidFill>
-                  <a:srgbClr val="A87236"/>
-                </a:solidFill>
-                <a:latin typeface="Courier New" panose="02070309020205020404" pitchFamily="49" charset="0"/>
-              </a:rPr>
-              <a:t>(self):</a:t>
+              <a:t>  def __init__(self):</a:t>
             </a:r>
           </a:p>
           <a:p>
@@ -27336,43 +27420,10 @@
                 </a:solidFill>
                 <a:latin typeface="Courier New" panose="02070309020205020404" pitchFamily="49" charset="0"/>
               </a:rPr>
-              <a:t>    # If instance already exists, then exception</a:t>
-            </a:r>
-          </a:p>
-          <a:p>
-            <a:pPr marL="82800" indent="0">
-              <a:buNone/>
-            </a:pPr>
-            <a:r>
-              <a:rPr lang="en-US" sz="2800" b="1">
-                <a:solidFill>
-                  <a:schemeClr val="accent2"/>
-                </a:solidFill>
-                <a:latin typeface="Courier New" panose="02070309020205020404" pitchFamily="49" charset="0"/>
-              </a:rPr>
-              <a:t>    if cls.__instance is not None:</a:t>
-            </a:r>
-          </a:p>
-          <a:p>
-            <a:pPr marL="82800" indent="0">
-              <a:buNone/>
-            </a:pPr>
-            <a:r>
-              <a:rPr lang="en-US" sz="2800" b="1">
-                <a:solidFill>
-                  <a:schemeClr val="accent2"/>
-                </a:solidFill>
-                <a:latin typeface="Courier New" panose="02070309020205020404" pitchFamily="49" charset="0"/>
-              </a:rPr>
-              <a:t>      raise Exception("This class is a singleton!")</a:t>
-            </a:r>
-          </a:p>
-          <a:p>
-            <a:pPr marL="82800" indent="0">
-              <a:buNone/>
-            </a:pPr>
-            <a:r>
-              <a:rPr lang="en-US" sz="2800" b="1">
+              <a:t>    </a:t>
+            </a:r>
+            <a:r>
+              <a:rPr lang="en-US" sz="2800" b="1" dirty="0">
                 <a:solidFill>
                   <a:schemeClr val="bg1">
                     <a:lumMod val="50000"/>
@@ -27380,7 +27431,7 @@
                 </a:solidFill>
                 <a:latin typeface="Courier New" panose="02070309020205020404" pitchFamily="49" charset="0"/>
               </a:rPr>
-              <a:t>    # Sequel of the constructor</a:t>
+              <a:t># If instance already exists, then exception</a:t>
             </a:r>
           </a:p>
           <a:p>
@@ -27390,11 +27441,52 @@
             <a:r>
               <a:rPr lang="en-US" sz="2800" b="1">
                 <a:solidFill>
-                  <a:srgbClr val="A87236"/>
-                </a:solidFill>
-                <a:latin typeface="Courier New" panose="02070309020205020404" pitchFamily="49" charset="0"/>
-              </a:rPr>
-              <a:t>    ... ...</a:t>
+                  <a:schemeClr val="accent2"/>
+                </a:solidFill>
+                <a:latin typeface="Courier New" panose="02070309020205020404" pitchFamily="49" charset="0"/>
+              </a:rPr>
+              <a:t>    if self.__instance</a:t>
+            </a:r>
+            <a:r>
+              <a:rPr lang="en-US" sz="2800" b="1" dirty="0">
+                <a:solidFill>
+                  <a:schemeClr val="accent2"/>
+                </a:solidFill>
+                <a:latin typeface="Courier New" panose="02070309020205020404" pitchFamily="49" charset="0"/>
+              </a:rPr>
+              <a:t> </a:t>
+            </a:r>
+            <a:r>
+              <a:rPr lang="en-US" sz="2800" b="1">
+                <a:solidFill>
+                  <a:schemeClr val="accent2"/>
+                </a:solidFill>
+                <a:latin typeface="Courier New" panose="02070309020205020404" pitchFamily="49" charset="0"/>
+              </a:rPr>
+              <a:t>is </a:t>
+            </a:r>
+            <a:r>
+              <a:rPr lang="en-US" sz="2800" b="1" dirty="0">
+                <a:solidFill>
+                  <a:schemeClr val="accent2"/>
+                </a:solidFill>
+                <a:latin typeface="Courier New" panose="02070309020205020404" pitchFamily="49" charset="0"/>
+              </a:rPr>
+              <a:t>not None:</a:t>
+            </a:r>
+          </a:p>
+          <a:p>
+            <a:pPr marL="82800" indent="0">
+              <a:buNone/>
+            </a:pPr>
+            <a:r>
+              <a:rPr lang="en-US" sz="2800" b="1" dirty="0">
+                <a:solidFill>
+                  <a:schemeClr val="accent2"/>
+                </a:solidFill>
+                <a:latin typeface="Courier New" panose="02070309020205020404" pitchFamily="49" charset="0"/>
+              </a:rPr>
+              <a:t>      raise Exception("This class is a singleton!")</a:t>
             </a:r>
           </a:p>
         </p:txBody>
@@ -27769,7 +27861,7 @@
         <p14:reveal/>
       </p:transition>
     </mc:Choice>
-    <mc:Fallback xmlns="" xmlns:mv="urn:schemas-microsoft-com:mac:vml" xmlns:c="http://schemas.openxmlformats.org/drawingml/2006/chart" xmlns:dgm="http://schemas.openxmlformats.org/drawingml/2006/diagram" xmlns:o="urn:schemas-microsoft-com:office:office" xmlns:v="urn:schemas-microsoft-com:vml" xmlns:pvml="urn:schemas-microsoft-com:office:powerpoint" xmlns:com="http://schemas.openxmlformats.org/drawingml/2006/compatibility" xmlns:p15="http://schemas.microsoft.com/office/powerpoint/2012/main" xmlns:ahyp="http://schemas.microsoft.com/office/drawing/2018/hyperlinkcolor">
+    <mc:Fallback xmlns:ahyp="http://schemas.microsoft.com/office/drawing/2018/hyperlinkcolor" xmlns:p15="http://schemas.microsoft.com/office/powerpoint/2012/main" xmlns:com="http://schemas.openxmlformats.org/drawingml/2006/compatibility" xmlns:pvml="urn:schemas-microsoft-com:office:powerpoint" xmlns:v="urn:schemas-microsoft-com:vml" xmlns:o="urn:schemas-microsoft-com:office:office" xmlns:dgm="http://schemas.openxmlformats.org/drawingml/2006/diagram" xmlns:c="http://schemas.openxmlformats.org/drawingml/2006/chart" xmlns:mv="urn:schemas-microsoft-com:mac:vml" xmlns="">
       <p:transition spd="med">
         <p:fade/>
       </p:transition>
@@ -28600,7 +28692,7 @@
         <p14:reveal/>
       </p:transition>
     </mc:Choice>
-    <mc:Fallback xmlns="" xmlns:mv="urn:schemas-microsoft-com:mac:vml" xmlns:c="http://schemas.openxmlformats.org/drawingml/2006/chart" xmlns:dgm="http://schemas.openxmlformats.org/drawingml/2006/diagram" xmlns:o="urn:schemas-microsoft-com:office:office" xmlns:v="urn:schemas-microsoft-com:vml" xmlns:pvml="urn:schemas-microsoft-com:office:powerpoint" xmlns:com="http://schemas.openxmlformats.org/drawingml/2006/compatibility" xmlns:p15="http://schemas.microsoft.com/office/powerpoint/2012/main" xmlns:ahyp="http://schemas.microsoft.com/office/drawing/2018/hyperlinkcolor">
+    <mc:Fallback xmlns:ahyp="http://schemas.microsoft.com/office/drawing/2018/hyperlinkcolor" xmlns:p15="http://schemas.microsoft.com/office/powerpoint/2012/main" xmlns:com="http://schemas.openxmlformats.org/drawingml/2006/compatibility" xmlns:pvml="urn:schemas-microsoft-com:office:powerpoint" xmlns:v="urn:schemas-microsoft-com:vml" xmlns:o="urn:schemas-microsoft-com:office:office" xmlns:dgm="http://schemas.openxmlformats.org/drawingml/2006/diagram" xmlns:c="http://schemas.openxmlformats.org/drawingml/2006/chart" xmlns:mv="urn:schemas-microsoft-com:mac:vml" xmlns="">
       <p:transition spd="med">
         <p:fade/>
       </p:transition>
@@ -28745,7 +28837,7 @@
         <p14:reveal/>
       </p:transition>
     </mc:Choice>
-    <mc:Fallback xmlns="" xmlns:mv="urn:schemas-microsoft-com:mac:vml" xmlns:c="http://schemas.openxmlformats.org/drawingml/2006/chart" xmlns:dgm="http://schemas.openxmlformats.org/drawingml/2006/diagram" xmlns:o="urn:schemas-microsoft-com:office:office" xmlns:v="urn:schemas-microsoft-com:vml" xmlns:pvml="urn:schemas-microsoft-com:office:powerpoint" xmlns:com="http://schemas.openxmlformats.org/drawingml/2006/compatibility" xmlns:p15="http://schemas.microsoft.com/office/powerpoint/2012/main" xmlns:ahyp="http://schemas.microsoft.com/office/drawing/2018/hyperlinkcolor">
+    <mc:Fallback xmlns:ahyp="http://schemas.microsoft.com/office/drawing/2018/hyperlinkcolor" xmlns:p15="http://schemas.microsoft.com/office/powerpoint/2012/main" xmlns:com="http://schemas.openxmlformats.org/drawingml/2006/compatibility" xmlns:pvml="urn:schemas-microsoft-com:office:powerpoint" xmlns:v="urn:schemas-microsoft-com:vml" xmlns:o="urn:schemas-microsoft-com:office:office" xmlns:dgm="http://schemas.openxmlformats.org/drawingml/2006/diagram" xmlns:c="http://schemas.openxmlformats.org/drawingml/2006/chart" xmlns:mv="urn:schemas-microsoft-com:mac:vml" xmlns="">
       <p:transition spd="med">
         <p:fade/>
       </p:transition>
@@ -29090,7 +29182,7 @@
         <p14:reveal/>
       </p:transition>
     </mc:Choice>
-    <mc:Fallback xmlns="" xmlns:mv="urn:schemas-microsoft-com:mac:vml" xmlns:c="http://schemas.openxmlformats.org/drawingml/2006/chart" xmlns:dgm="http://schemas.openxmlformats.org/drawingml/2006/diagram" xmlns:o="urn:schemas-microsoft-com:office:office" xmlns:v="urn:schemas-microsoft-com:vml" xmlns:pvml="urn:schemas-microsoft-com:office:powerpoint" xmlns:com="http://schemas.openxmlformats.org/drawingml/2006/compatibility" xmlns:p15="http://schemas.microsoft.com/office/powerpoint/2012/main" xmlns:ahyp="http://schemas.microsoft.com/office/drawing/2018/hyperlinkcolor">
+    <mc:Fallback xmlns:ahyp="http://schemas.microsoft.com/office/drawing/2018/hyperlinkcolor" xmlns:p15="http://schemas.microsoft.com/office/powerpoint/2012/main" xmlns:com="http://schemas.openxmlformats.org/drawingml/2006/compatibility" xmlns:pvml="urn:schemas-microsoft-com:office:powerpoint" xmlns:v="urn:schemas-microsoft-com:vml" xmlns:o="urn:schemas-microsoft-com:office:office" xmlns:dgm="http://schemas.openxmlformats.org/drawingml/2006/diagram" xmlns:c="http://schemas.openxmlformats.org/drawingml/2006/chart" xmlns:mv="urn:schemas-microsoft-com:mac:vml" xmlns="">
       <p:transition spd="med">
         <p:fade/>
       </p:transition>
@@ -29171,7 +29263,7 @@
         <p14:reveal/>
       </p:transition>
     </mc:Choice>
-    <mc:Fallback xmlns="" xmlns:mv="urn:schemas-microsoft-com:mac:vml" xmlns:c="http://schemas.openxmlformats.org/drawingml/2006/chart" xmlns:dgm="http://schemas.openxmlformats.org/drawingml/2006/diagram" xmlns:o="urn:schemas-microsoft-com:office:office" xmlns:v="urn:schemas-microsoft-com:vml" xmlns:pvml="urn:schemas-microsoft-com:office:powerpoint" xmlns:com="http://schemas.openxmlformats.org/drawingml/2006/compatibility" xmlns:p15="http://schemas.microsoft.com/office/powerpoint/2012/main" xmlns:ahyp="http://schemas.microsoft.com/office/drawing/2018/hyperlinkcolor">
+    <mc:Fallback xmlns:ahyp="http://schemas.microsoft.com/office/drawing/2018/hyperlinkcolor" xmlns:p15="http://schemas.microsoft.com/office/powerpoint/2012/main" xmlns:com="http://schemas.openxmlformats.org/drawingml/2006/compatibility" xmlns:pvml="urn:schemas-microsoft-com:office:powerpoint" xmlns:v="urn:schemas-microsoft-com:vml" xmlns:o="urn:schemas-microsoft-com:office:office" xmlns:dgm="http://schemas.openxmlformats.org/drawingml/2006/diagram" xmlns:c="http://schemas.openxmlformats.org/drawingml/2006/chart" xmlns:mv="urn:schemas-microsoft-com:mac:vml" xmlns="">
       <p:transition spd="med">
         <p:fade/>
       </p:transition>

</xml_diff>

<commit_message>
cours Design Pattern 2025/01/09
</commit_message>
<xml_diff>
--- a/syllabus/17-POO-design-pattern/17_syllabus.pptx
+++ b/syllabus/17-POO-design-pattern/17_syllabus.pptx
@@ -450,7 +450,7 @@
       </p15:notesGuideLst>
     </p:ext>
     <p:ext uri="http://customooxmlschemas.google.com/">
-      <go:slidesCustomData xmlns:go="http://customooxmlschemas.google.com/" xmlns:ahyp="http://schemas.microsoft.com/office/drawing/2018/hyperlinkcolor" xmlns:p15="http://schemas.microsoft.com/office/powerpoint/2012/main" xmlns:p14="http://schemas.microsoft.com/office/powerpoint/2010/main" xmlns:com="http://schemas.openxmlformats.org/drawingml/2006/compatibility" xmlns:pvml="urn:schemas-microsoft-com:office:powerpoint" xmlns:v="urn:schemas-microsoft-com:vml" xmlns:o="urn:schemas-microsoft-com:office:office" xmlns:dgm="http://schemas.openxmlformats.org/drawingml/2006/diagram" xmlns:c="http://schemas.openxmlformats.org/drawingml/2006/chart" xmlns:mv="urn:schemas-microsoft-com:mac:vml" xmlns:mc="http://schemas.openxmlformats.org/markup-compatibility/2006" xmlns="" r:id="rId82" roundtripDataSignature="AMtx7mjSZQRmqTMWKYRBXmlYNJjeBKn4Mw=="/>
+      <go:slidesCustomData xmlns="" xmlns:mc="http://schemas.openxmlformats.org/markup-compatibility/2006" xmlns:mv="urn:schemas-microsoft-com:mac:vml" xmlns:c="http://schemas.openxmlformats.org/drawingml/2006/chart" xmlns:dgm="http://schemas.openxmlformats.org/drawingml/2006/diagram" xmlns:o="urn:schemas-microsoft-com:office:office" xmlns:v="urn:schemas-microsoft-com:vml" xmlns:pvml="urn:schemas-microsoft-com:office:powerpoint" xmlns:com="http://schemas.openxmlformats.org/drawingml/2006/compatibility" xmlns:p14="http://schemas.microsoft.com/office/powerpoint/2010/main" xmlns:p15="http://schemas.microsoft.com/office/powerpoint/2012/main" xmlns:ahyp="http://schemas.microsoft.com/office/drawing/2018/hyperlinkcolor" xmlns:go="http://customooxmlschemas.google.com/" r:id="rId82" roundtripDataSignature="AMtx7mjSZQRmqTMWKYRBXmlYNJjeBKn4Mw=="/>
     </p:ext>
   </p:extLst>
 </p:presentation>
@@ -3090,7 +3090,7 @@
         <p14:reveal/>
       </p:transition>
     </mc:Choice>
-    <mc:Fallback xmlns:ahyp="http://schemas.microsoft.com/office/drawing/2018/hyperlinkcolor" xmlns:p15="http://schemas.microsoft.com/office/powerpoint/2012/main" xmlns:com="http://schemas.openxmlformats.org/drawingml/2006/compatibility" xmlns:pvml="urn:schemas-microsoft-com:office:powerpoint" xmlns:v="urn:schemas-microsoft-com:vml" xmlns:o="urn:schemas-microsoft-com:office:office" xmlns:dgm="http://schemas.openxmlformats.org/drawingml/2006/diagram" xmlns:c="http://schemas.openxmlformats.org/drawingml/2006/chart" xmlns:mv="urn:schemas-microsoft-com:mac:vml" xmlns="">
+    <mc:Fallback xmlns="" xmlns:mv="urn:schemas-microsoft-com:mac:vml" xmlns:c="http://schemas.openxmlformats.org/drawingml/2006/chart" xmlns:dgm="http://schemas.openxmlformats.org/drawingml/2006/diagram" xmlns:o="urn:schemas-microsoft-com:office:office" xmlns:v="urn:schemas-microsoft-com:vml" xmlns:pvml="urn:schemas-microsoft-com:office:powerpoint" xmlns:com="http://schemas.openxmlformats.org/drawingml/2006/compatibility" xmlns:p15="http://schemas.microsoft.com/office/powerpoint/2012/main" xmlns:ahyp="http://schemas.microsoft.com/office/drawing/2018/hyperlinkcolor">
       <p:transition spd="med">
         <p:fade/>
       </p:transition>
@@ -3404,7 +3404,7 @@
         <p14:reveal/>
       </p:transition>
     </mc:Choice>
-    <mc:Fallback xmlns:ahyp="http://schemas.microsoft.com/office/drawing/2018/hyperlinkcolor" xmlns:p15="http://schemas.microsoft.com/office/powerpoint/2012/main" xmlns:com="http://schemas.openxmlformats.org/drawingml/2006/compatibility" xmlns:pvml="urn:schemas-microsoft-com:office:powerpoint" xmlns:v="urn:schemas-microsoft-com:vml" xmlns:o="urn:schemas-microsoft-com:office:office" xmlns:dgm="http://schemas.openxmlformats.org/drawingml/2006/diagram" xmlns:c="http://schemas.openxmlformats.org/drawingml/2006/chart" xmlns:mv="urn:schemas-microsoft-com:mac:vml" xmlns="">
+    <mc:Fallback xmlns="" xmlns:mv="urn:schemas-microsoft-com:mac:vml" xmlns:c="http://schemas.openxmlformats.org/drawingml/2006/chart" xmlns:dgm="http://schemas.openxmlformats.org/drawingml/2006/diagram" xmlns:o="urn:schemas-microsoft-com:office:office" xmlns:v="urn:schemas-microsoft-com:vml" xmlns:pvml="urn:schemas-microsoft-com:office:powerpoint" xmlns:com="http://schemas.openxmlformats.org/drawingml/2006/compatibility" xmlns:p15="http://schemas.microsoft.com/office/powerpoint/2012/main" xmlns:ahyp="http://schemas.microsoft.com/office/drawing/2018/hyperlinkcolor">
       <p:transition spd="med">
         <p:fade/>
       </p:transition>
@@ -3812,7 +3812,7 @@
         <p14:reveal/>
       </p:transition>
     </mc:Choice>
-    <mc:Fallback xmlns:ahyp="http://schemas.microsoft.com/office/drawing/2018/hyperlinkcolor" xmlns:p15="http://schemas.microsoft.com/office/powerpoint/2012/main" xmlns:com="http://schemas.openxmlformats.org/drawingml/2006/compatibility" xmlns:pvml="urn:schemas-microsoft-com:office:powerpoint" xmlns:v="urn:schemas-microsoft-com:vml" xmlns:o="urn:schemas-microsoft-com:office:office" xmlns:dgm="http://schemas.openxmlformats.org/drawingml/2006/diagram" xmlns:c="http://schemas.openxmlformats.org/drawingml/2006/chart" xmlns:mv="urn:schemas-microsoft-com:mac:vml" xmlns="">
+    <mc:Fallback xmlns="" xmlns:mv="urn:schemas-microsoft-com:mac:vml" xmlns:c="http://schemas.openxmlformats.org/drawingml/2006/chart" xmlns:dgm="http://schemas.openxmlformats.org/drawingml/2006/diagram" xmlns:o="urn:schemas-microsoft-com:office:office" xmlns:v="urn:schemas-microsoft-com:vml" xmlns:pvml="urn:schemas-microsoft-com:office:powerpoint" xmlns:com="http://schemas.openxmlformats.org/drawingml/2006/compatibility" xmlns:p15="http://schemas.microsoft.com/office/powerpoint/2012/main" xmlns:ahyp="http://schemas.microsoft.com/office/drawing/2018/hyperlinkcolor">
       <p:transition spd="med">
         <p:fade/>
       </p:transition>
@@ -4174,7 +4174,7 @@
         <p14:reveal/>
       </p:transition>
     </mc:Choice>
-    <mc:Fallback xmlns:ahyp="http://schemas.microsoft.com/office/drawing/2018/hyperlinkcolor" xmlns:p15="http://schemas.microsoft.com/office/powerpoint/2012/main" xmlns:com="http://schemas.openxmlformats.org/drawingml/2006/compatibility" xmlns:pvml="urn:schemas-microsoft-com:office:powerpoint" xmlns:v="urn:schemas-microsoft-com:vml" xmlns:o="urn:schemas-microsoft-com:office:office" xmlns:dgm="http://schemas.openxmlformats.org/drawingml/2006/diagram" xmlns:c="http://schemas.openxmlformats.org/drawingml/2006/chart" xmlns:mv="urn:schemas-microsoft-com:mac:vml" xmlns="">
+    <mc:Fallback xmlns="" xmlns:mv="urn:schemas-microsoft-com:mac:vml" xmlns:c="http://schemas.openxmlformats.org/drawingml/2006/chart" xmlns:dgm="http://schemas.openxmlformats.org/drawingml/2006/diagram" xmlns:o="urn:schemas-microsoft-com:office:office" xmlns:v="urn:schemas-microsoft-com:vml" xmlns:pvml="urn:schemas-microsoft-com:office:powerpoint" xmlns:com="http://schemas.openxmlformats.org/drawingml/2006/compatibility" xmlns:p15="http://schemas.microsoft.com/office/powerpoint/2012/main" xmlns:ahyp="http://schemas.microsoft.com/office/drawing/2018/hyperlinkcolor">
       <p:transition spd="med">
         <p:fade/>
       </p:transition>
@@ -4737,7 +4737,7 @@
         <p14:reveal/>
       </p:transition>
     </mc:Choice>
-    <mc:Fallback xmlns:ahyp="http://schemas.microsoft.com/office/drawing/2018/hyperlinkcolor" xmlns:p15="http://schemas.microsoft.com/office/powerpoint/2012/main" xmlns:com="http://schemas.openxmlformats.org/drawingml/2006/compatibility" xmlns:pvml="urn:schemas-microsoft-com:office:powerpoint" xmlns:v="urn:schemas-microsoft-com:vml" xmlns:o="urn:schemas-microsoft-com:office:office" xmlns:dgm="http://schemas.openxmlformats.org/drawingml/2006/diagram" xmlns:c="http://schemas.openxmlformats.org/drawingml/2006/chart" xmlns:mv="urn:schemas-microsoft-com:mac:vml" xmlns="">
+    <mc:Fallback xmlns="" xmlns:mv="urn:schemas-microsoft-com:mac:vml" xmlns:c="http://schemas.openxmlformats.org/drawingml/2006/chart" xmlns:dgm="http://schemas.openxmlformats.org/drawingml/2006/diagram" xmlns:o="urn:schemas-microsoft-com:office:office" xmlns:v="urn:schemas-microsoft-com:vml" xmlns:pvml="urn:schemas-microsoft-com:office:powerpoint" xmlns:com="http://schemas.openxmlformats.org/drawingml/2006/compatibility" xmlns:p15="http://schemas.microsoft.com/office/powerpoint/2012/main" xmlns:ahyp="http://schemas.microsoft.com/office/drawing/2018/hyperlinkcolor">
       <p:transition spd="med">
         <p:fade/>
       </p:transition>
@@ -5333,7 +5333,7 @@
         <p14:reveal/>
       </p:transition>
     </mc:Choice>
-    <mc:Fallback xmlns:ahyp="http://schemas.microsoft.com/office/drawing/2018/hyperlinkcolor" xmlns:p15="http://schemas.microsoft.com/office/powerpoint/2012/main" xmlns:com="http://schemas.openxmlformats.org/drawingml/2006/compatibility" xmlns:pvml="urn:schemas-microsoft-com:office:powerpoint" xmlns:v="urn:schemas-microsoft-com:vml" xmlns:o="urn:schemas-microsoft-com:office:office" xmlns:dgm="http://schemas.openxmlformats.org/drawingml/2006/diagram" xmlns:c="http://schemas.openxmlformats.org/drawingml/2006/chart" xmlns:mv="urn:schemas-microsoft-com:mac:vml" xmlns="">
+    <mc:Fallback xmlns="" xmlns:mv="urn:schemas-microsoft-com:mac:vml" xmlns:c="http://schemas.openxmlformats.org/drawingml/2006/chart" xmlns:dgm="http://schemas.openxmlformats.org/drawingml/2006/diagram" xmlns:o="urn:schemas-microsoft-com:office:office" xmlns:v="urn:schemas-microsoft-com:vml" xmlns:pvml="urn:schemas-microsoft-com:office:powerpoint" xmlns:com="http://schemas.openxmlformats.org/drawingml/2006/compatibility" xmlns:p15="http://schemas.microsoft.com/office/powerpoint/2012/main" xmlns:ahyp="http://schemas.microsoft.com/office/drawing/2018/hyperlinkcolor">
       <p:transition spd="med">
         <p:fade/>
       </p:transition>
@@ -5513,7 +5513,7 @@
         <p14:reveal/>
       </p:transition>
     </mc:Choice>
-    <mc:Fallback xmlns:ahyp="http://schemas.microsoft.com/office/drawing/2018/hyperlinkcolor" xmlns:p15="http://schemas.microsoft.com/office/powerpoint/2012/main" xmlns:com="http://schemas.openxmlformats.org/drawingml/2006/compatibility" xmlns:pvml="urn:schemas-microsoft-com:office:powerpoint" xmlns:v="urn:schemas-microsoft-com:vml" xmlns:o="urn:schemas-microsoft-com:office:office" xmlns:dgm="http://schemas.openxmlformats.org/drawingml/2006/diagram" xmlns:c="http://schemas.openxmlformats.org/drawingml/2006/chart" xmlns:mv="urn:schemas-microsoft-com:mac:vml" xmlns="">
+    <mc:Fallback xmlns="" xmlns:mv="urn:schemas-microsoft-com:mac:vml" xmlns:c="http://schemas.openxmlformats.org/drawingml/2006/chart" xmlns:dgm="http://schemas.openxmlformats.org/drawingml/2006/diagram" xmlns:o="urn:schemas-microsoft-com:office:office" xmlns:v="urn:schemas-microsoft-com:vml" xmlns:pvml="urn:schemas-microsoft-com:office:powerpoint" xmlns:com="http://schemas.openxmlformats.org/drawingml/2006/compatibility" xmlns:p15="http://schemas.microsoft.com/office/powerpoint/2012/main" xmlns:ahyp="http://schemas.microsoft.com/office/drawing/2018/hyperlinkcolor">
       <p:transition spd="med">
         <p:fade/>
       </p:transition>
@@ -5951,7 +5951,7 @@
         <p14:reveal/>
       </p:transition>
     </mc:Choice>
-    <mc:Fallback xmlns:ahyp="http://schemas.microsoft.com/office/drawing/2018/hyperlinkcolor" xmlns:p15="http://schemas.microsoft.com/office/powerpoint/2012/main" xmlns:com="http://schemas.openxmlformats.org/drawingml/2006/compatibility" xmlns:pvml="urn:schemas-microsoft-com:office:powerpoint" xmlns:v="urn:schemas-microsoft-com:vml" xmlns:o="urn:schemas-microsoft-com:office:office" xmlns:dgm="http://schemas.openxmlformats.org/drawingml/2006/diagram" xmlns:c="http://schemas.openxmlformats.org/drawingml/2006/chart" xmlns:mv="urn:schemas-microsoft-com:mac:vml" xmlns="">
+    <mc:Fallback xmlns="" xmlns:mv="urn:schemas-microsoft-com:mac:vml" xmlns:c="http://schemas.openxmlformats.org/drawingml/2006/chart" xmlns:dgm="http://schemas.openxmlformats.org/drawingml/2006/diagram" xmlns:o="urn:schemas-microsoft-com:office:office" xmlns:v="urn:schemas-microsoft-com:vml" xmlns:pvml="urn:schemas-microsoft-com:office:powerpoint" xmlns:com="http://schemas.openxmlformats.org/drawingml/2006/compatibility" xmlns:p15="http://schemas.microsoft.com/office/powerpoint/2012/main" xmlns:ahyp="http://schemas.microsoft.com/office/drawing/2018/hyperlinkcolor">
       <p:transition spd="med">
         <p:fade/>
       </p:transition>
@@ -6368,7 +6368,7 @@
         <p14:reveal/>
       </p:transition>
     </mc:Choice>
-    <mc:Fallback xmlns:ahyp="http://schemas.microsoft.com/office/drawing/2018/hyperlinkcolor" xmlns:p15="http://schemas.microsoft.com/office/powerpoint/2012/main" xmlns:com="http://schemas.openxmlformats.org/drawingml/2006/compatibility" xmlns:pvml="urn:schemas-microsoft-com:office:powerpoint" xmlns:v="urn:schemas-microsoft-com:vml" xmlns:o="urn:schemas-microsoft-com:office:office" xmlns:dgm="http://schemas.openxmlformats.org/drawingml/2006/diagram" xmlns:c="http://schemas.openxmlformats.org/drawingml/2006/chart" xmlns:mv="urn:schemas-microsoft-com:mac:vml" xmlns="">
+    <mc:Fallback xmlns="" xmlns:mv="urn:schemas-microsoft-com:mac:vml" xmlns:c="http://schemas.openxmlformats.org/drawingml/2006/chart" xmlns:dgm="http://schemas.openxmlformats.org/drawingml/2006/diagram" xmlns:o="urn:schemas-microsoft-com:office:office" xmlns:v="urn:schemas-microsoft-com:vml" xmlns:pvml="urn:schemas-microsoft-com:office:powerpoint" xmlns:com="http://schemas.openxmlformats.org/drawingml/2006/compatibility" xmlns:p15="http://schemas.microsoft.com/office/powerpoint/2012/main" xmlns:ahyp="http://schemas.microsoft.com/office/drawing/2018/hyperlinkcolor">
       <p:transition spd="med">
         <p:fade/>
       </p:transition>
@@ -7258,7 +7258,7 @@
         <p14:reveal/>
       </p:transition>
     </mc:Choice>
-    <mc:Fallback xmlns:ahyp="http://schemas.microsoft.com/office/drawing/2018/hyperlinkcolor" xmlns:p15="http://schemas.microsoft.com/office/powerpoint/2012/main" xmlns:com="http://schemas.openxmlformats.org/drawingml/2006/compatibility" xmlns:pvml="urn:schemas-microsoft-com:office:powerpoint" xmlns:v="urn:schemas-microsoft-com:vml" xmlns:o="urn:schemas-microsoft-com:office:office" xmlns:dgm="http://schemas.openxmlformats.org/drawingml/2006/diagram" xmlns:c="http://schemas.openxmlformats.org/drawingml/2006/chart" xmlns:mv="urn:schemas-microsoft-com:mac:vml" xmlns="">
+    <mc:Fallback xmlns="" xmlns:mv="urn:schemas-microsoft-com:mac:vml" xmlns:c="http://schemas.openxmlformats.org/drawingml/2006/chart" xmlns:dgm="http://schemas.openxmlformats.org/drawingml/2006/diagram" xmlns:o="urn:schemas-microsoft-com:office:office" xmlns:v="urn:schemas-microsoft-com:vml" xmlns:pvml="urn:schemas-microsoft-com:office:powerpoint" xmlns:com="http://schemas.openxmlformats.org/drawingml/2006/compatibility" xmlns:p15="http://schemas.microsoft.com/office/powerpoint/2012/main" xmlns:ahyp="http://schemas.microsoft.com/office/drawing/2018/hyperlinkcolor">
       <p:transition spd="med">
         <p:fade/>
       </p:transition>
@@ -7458,7 +7458,7 @@
         <p14:reveal/>
       </p:transition>
     </mc:Choice>
-    <mc:Fallback xmlns:ahyp="http://schemas.microsoft.com/office/drawing/2018/hyperlinkcolor" xmlns:p15="http://schemas.microsoft.com/office/powerpoint/2012/main" xmlns:com="http://schemas.openxmlformats.org/drawingml/2006/compatibility" xmlns:pvml="urn:schemas-microsoft-com:office:powerpoint" xmlns:v="urn:schemas-microsoft-com:vml" xmlns:o="urn:schemas-microsoft-com:office:office" xmlns:dgm="http://schemas.openxmlformats.org/drawingml/2006/diagram" xmlns:c="http://schemas.openxmlformats.org/drawingml/2006/chart" xmlns:mv="urn:schemas-microsoft-com:mac:vml" xmlns="">
+    <mc:Fallback xmlns="" xmlns:mv="urn:schemas-microsoft-com:mac:vml" xmlns:c="http://schemas.openxmlformats.org/drawingml/2006/chart" xmlns:dgm="http://schemas.openxmlformats.org/drawingml/2006/diagram" xmlns:o="urn:schemas-microsoft-com:office:office" xmlns:v="urn:schemas-microsoft-com:vml" xmlns:pvml="urn:schemas-microsoft-com:office:powerpoint" xmlns:com="http://schemas.openxmlformats.org/drawingml/2006/compatibility" xmlns:p15="http://schemas.microsoft.com/office/powerpoint/2012/main" xmlns:ahyp="http://schemas.microsoft.com/office/drawing/2018/hyperlinkcolor">
       <p:transition spd="med">
         <p:fade/>
       </p:transition>
@@ -7878,7 +7878,7 @@
         <p14:reveal/>
       </p:transition>
     </mc:Choice>
-    <mc:Fallback xmlns:ahyp="http://schemas.microsoft.com/office/drawing/2018/hyperlinkcolor" xmlns:p15="http://schemas.microsoft.com/office/powerpoint/2012/main" xmlns:com="http://schemas.openxmlformats.org/drawingml/2006/compatibility" xmlns:pvml="urn:schemas-microsoft-com:office:powerpoint" xmlns:v="urn:schemas-microsoft-com:vml" xmlns:o="urn:schemas-microsoft-com:office:office" xmlns:dgm="http://schemas.openxmlformats.org/drawingml/2006/diagram" xmlns:c="http://schemas.openxmlformats.org/drawingml/2006/chart" xmlns:mv="urn:schemas-microsoft-com:mac:vml" xmlns="">
+    <mc:Fallback xmlns="" xmlns:mv="urn:schemas-microsoft-com:mac:vml" xmlns:c="http://schemas.openxmlformats.org/drawingml/2006/chart" xmlns:dgm="http://schemas.openxmlformats.org/drawingml/2006/diagram" xmlns:o="urn:schemas-microsoft-com:office:office" xmlns:v="urn:schemas-microsoft-com:vml" xmlns:pvml="urn:schemas-microsoft-com:office:powerpoint" xmlns:com="http://schemas.openxmlformats.org/drawingml/2006/compatibility" xmlns:p15="http://schemas.microsoft.com/office/powerpoint/2012/main" xmlns:ahyp="http://schemas.microsoft.com/office/drawing/2018/hyperlinkcolor">
       <p:transition spd="med">
         <p:fade/>
       </p:transition>
@@ -9384,7 +9384,7 @@
         <p14:reveal/>
       </p:transition>
     </mc:Choice>
-    <mc:Fallback xmlns:ahyp="http://schemas.microsoft.com/office/drawing/2018/hyperlinkcolor" xmlns:p15="http://schemas.microsoft.com/office/powerpoint/2012/main" xmlns:com="http://schemas.openxmlformats.org/drawingml/2006/compatibility" xmlns:pvml="urn:schemas-microsoft-com:office:powerpoint" xmlns:v="urn:schemas-microsoft-com:vml" xmlns:o="urn:schemas-microsoft-com:office:office" xmlns:dgm="http://schemas.openxmlformats.org/drawingml/2006/diagram" xmlns:c="http://schemas.openxmlformats.org/drawingml/2006/chart" xmlns:mv="urn:schemas-microsoft-com:mac:vml" xmlns="">
+    <mc:Fallback xmlns="" xmlns:mv="urn:schemas-microsoft-com:mac:vml" xmlns:c="http://schemas.openxmlformats.org/drawingml/2006/chart" xmlns:dgm="http://schemas.openxmlformats.org/drawingml/2006/diagram" xmlns:o="urn:schemas-microsoft-com:office:office" xmlns:v="urn:schemas-microsoft-com:vml" xmlns:pvml="urn:schemas-microsoft-com:office:powerpoint" xmlns:com="http://schemas.openxmlformats.org/drawingml/2006/compatibility" xmlns:p15="http://schemas.microsoft.com/office/powerpoint/2012/main" xmlns:ahyp="http://schemas.microsoft.com/office/drawing/2018/hyperlinkcolor">
       <p:transition spd="med">
         <p:fade/>
       </p:transition>
@@ -9507,7 +9507,7 @@
         <p14:reveal/>
       </p:transition>
     </mc:Choice>
-    <mc:Fallback xmlns:ahyp="http://schemas.microsoft.com/office/drawing/2018/hyperlinkcolor" xmlns:p15="http://schemas.microsoft.com/office/powerpoint/2012/main" xmlns:com="http://schemas.openxmlformats.org/drawingml/2006/compatibility" xmlns:pvml="urn:schemas-microsoft-com:office:powerpoint" xmlns:v="urn:schemas-microsoft-com:vml" xmlns:o="urn:schemas-microsoft-com:office:office" xmlns:dgm="http://schemas.openxmlformats.org/drawingml/2006/diagram" xmlns:c="http://schemas.openxmlformats.org/drawingml/2006/chart" xmlns:mv="urn:schemas-microsoft-com:mac:vml" xmlns="">
+    <mc:Fallback xmlns="" xmlns:mv="urn:schemas-microsoft-com:mac:vml" xmlns:c="http://schemas.openxmlformats.org/drawingml/2006/chart" xmlns:dgm="http://schemas.openxmlformats.org/drawingml/2006/diagram" xmlns:o="urn:schemas-microsoft-com:office:office" xmlns:v="urn:schemas-microsoft-com:vml" xmlns:pvml="urn:schemas-microsoft-com:office:powerpoint" xmlns:com="http://schemas.openxmlformats.org/drawingml/2006/compatibility" xmlns:p15="http://schemas.microsoft.com/office/powerpoint/2012/main" xmlns:ahyp="http://schemas.microsoft.com/office/drawing/2018/hyperlinkcolor">
       <p:transition spd="med">
         <p:fade/>
       </p:transition>
@@ -10167,7 +10167,7 @@
         <p14:reveal/>
       </p:transition>
     </mc:Choice>
-    <mc:Fallback xmlns:ahyp="http://schemas.microsoft.com/office/drawing/2018/hyperlinkcolor" xmlns:p15="http://schemas.microsoft.com/office/powerpoint/2012/main" xmlns:com="http://schemas.openxmlformats.org/drawingml/2006/compatibility" xmlns:pvml="urn:schemas-microsoft-com:office:powerpoint" xmlns:v="urn:schemas-microsoft-com:vml" xmlns:o="urn:schemas-microsoft-com:office:office" xmlns:dgm="http://schemas.openxmlformats.org/drawingml/2006/diagram" xmlns:c="http://schemas.openxmlformats.org/drawingml/2006/chart" xmlns:mv="urn:schemas-microsoft-com:mac:vml" xmlns="">
+    <mc:Fallback xmlns="" xmlns:mv="urn:schemas-microsoft-com:mac:vml" xmlns:c="http://schemas.openxmlformats.org/drawingml/2006/chart" xmlns:dgm="http://schemas.openxmlformats.org/drawingml/2006/diagram" xmlns:o="urn:schemas-microsoft-com:office:office" xmlns:v="urn:schemas-microsoft-com:vml" xmlns:pvml="urn:schemas-microsoft-com:office:powerpoint" xmlns:com="http://schemas.openxmlformats.org/drawingml/2006/compatibility" xmlns:p15="http://schemas.microsoft.com/office/powerpoint/2012/main" xmlns:ahyp="http://schemas.microsoft.com/office/drawing/2018/hyperlinkcolor">
       <p:transition spd="med">
         <p:fade/>
       </p:transition>
@@ -10537,7 +10537,7 @@
         <p14:reveal/>
       </p:transition>
     </mc:Choice>
-    <mc:Fallback xmlns:ahyp="http://schemas.microsoft.com/office/drawing/2018/hyperlinkcolor" xmlns:p15="http://schemas.microsoft.com/office/powerpoint/2012/main" xmlns:com="http://schemas.openxmlformats.org/drawingml/2006/compatibility" xmlns:pvml="urn:schemas-microsoft-com:office:powerpoint" xmlns:v="urn:schemas-microsoft-com:vml" xmlns:o="urn:schemas-microsoft-com:office:office" xmlns:dgm="http://schemas.openxmlformats.org/drawingml/2006/diagram" xmlns:c="http://schemas.openxmlformats.org/drawingml/2006/chart" xmlns:mv="urn:schemas-microsoft-com:mac:vml" xmlns="">
+    <mc:Fallback xmlns="" xmlns:mv="urn:schemas-microsoft-com:mac:vml" xmlns:c="http://schemas.openxmlformats.org/drawingml/2006/chart" xmlns:dgm="http://schemas.openxmlformats.org/drawingml/2006/diagram" xmlns:o="urn:schemas-microsoft-com:office:office" xmlns:v="urn:schemas-microsoft-com:vml" xmlns:pvml="urn:schemas-microsoft-com:office:powerpoint" xmlns:com="http://schemas.openxmlformats.org/drawingml/2006/compatibility" xmlns:p15="http://schemas.microsoft.com/office/powerpoint/2012/main" xmlns:ahyp="http://schemas.microsoft.com/office/drawing/2018/hyperlinkcolor">
       <p:transition spd="med">
         <p:fade/>
       </p:transition>
@@ -11350,7 +11350,7 @@
         <p14:reveal/>
       </p:transition>
     </mc:Choice>
-    <mc:Fallback xmlns:ahyp="http://schemas.microsoft.com/office/drawing/2018/hyperlinkcolor" xmlns:p15="http://schemas.microsoft.com/office/powerpoint/2012/main" xmlns:com="http://schemas.openxmlformats.org/drawingml/2006/compatibility" xmlns:pvml="urn:schemas-microsoft-com:office:powerpoint" xmlns:v="urn:schemas-microsoft-com:vml" xmlns:o="urn:schemas-microsoft-com:office:office" xmlns:dgm="http://schemas.openxmlformats.org/drawingml/2006/diagram" xmlns:c="http://schemas.openxmlformats.org/drawingml/2006/chart" xmlns:mv="urn:schemas-microsoft-com:mac:vml" xmlns="">
+    <mc:Fallback xmlns="" xmlns:mv="urn:schemas-microsoft-com:mac:vml" xmlns:c="http://schemas.openxmlformats.org/drawingml/2006/chart" xmlns:dgm="http://schemas.openxmlformats.org/drawingml/2006/diagram" xmlns:o="urn:schemas-microsoft-com:office:office" xmlns:v="urn:schemas-microsoft-com:vml" xmlns:pvml="urn:schemas-microsoft-com:office:powerpoint" xmlns:com="http://schemas.openxmlformats.org/drawingml/2006/compatibility" xmlns:p15="http://schemas.microsoft.com/office/powerpoint/2012/main" xmlns:ahyp="http://schemas.microsoft.com/office/drawing/2018/hyperlinkcolor">
       <p:transition spd="med">
         <p:fade/>
       </p:transition>
@@ -11920,7 +11920,7 @@
         <p14:reveal/>
       </p:transition>
     </mc:Choice>
-    <mc:Fallback xmlns:ahyp="http://schemas.microsoft.com/office/drawing/2018/hyperlinkcolor" xmlns:p15="http://schemas.microsoft.com/office/powerpoint/2012/main" xmlns:com="http://schemas.openxmlformats.org/drawingml/2006/compatibility" xmlns:pvml="urn:schemas-microsoft-com:office:powerpoint" xmlns:v="urn:schemas-microsoft-com:vml" xmlns:o="urn:schemas-microsoft-com:office:office" xmlns:dgm="http://schemas.openxmlformats.org/drawingml/2006/diagram" xmlns:c="http://schemas.openxmlformats.org/drawingml/2006/chart" xmlns:mv="urn:schemas-microsoft-com:mac:vml" xmlns="">
+    <mc:Fallback xmlns="" xmlns:mv="urn:schemas-microsoft-com:mac:vml" xmlns:c="http://schemas.openxmlformats.org/drawingml/2006/chart" xmlns:dgm="http://schemas.openxmlformats.org/drawingml/2006/diagram" xmlns:o="urn:schemas-microsoft-com:office:office" xmlns:v="urn:schemas-microsoft-com:vml" xmlns:pvml="urn:schemas-microsoft-com:office:powerpoint" xmlns:com="http://schemas.openxmlformats.org/drawingml/2006/compatibility" xmlns:p15="http://schemas.microsoft.com/office/powerpoint/2012/main" xmlns:ahyp="http://schemas.microsoft.com/office/drawing/2018/hyperlinkcolor">
       <p:transition spd="med">
         <p:fade/>
       </p:transition>
@@ -12672,7 +12672,7 @@
         <p14:reveal/>
       </p:transition>
     </mc:Choice>
-    <mc:Fallback xmlns:ahyp="http://schemas.microsoft.com/office/drawing/2018/hyperlinkcolor" xmlns:p15="http://schemas.microsoft.com/office/powerpoint/2012/main" xmlns:com="http://schemas.openxmlformats.org/drawingml/2006/compatibility" xmlns:pvml="urn:schemas-microsoft-com:office:powerpoint" xmlns:v="urn:schemas-microsoft-com:vml" xmlns:o="urn:schemas-microsoft-com:office:office" xmlns:dgm="http://schemas.openxmlformats.org/drawingml/2006/diagram" xmlns:c="http://schemas.openxmlformats.org/drawingml/2006/chart" xmlns:mv="urn:schemas-microsoft-com:mac:vml" xmlns="">
+    <mc:Fallback xmlns="" xmlns:mv="urn:schemas-microsoft-com:mac:vml" xmlns:c="http://schemas.openxmlformats.org/drawingml/2006/chart" xmlns:dgm="http://schemas.openxmlformats.org/drawingml/2006/diagram" xmlns:o="urn:schemas-microsoft-com:office:office" xmlns:v="urn:schemas-microsoft-com:vml" xmlns:pvml="urn:schemas-microsoft-com:office:powerpoint" xmlns:com="http://schemas.openxmlformats.org/drawingml/2006/compatibility" xmlns:p15="http://schemas.microsoft.com/office/powerpoint/2012/main" xmlns:ahyp="http://schemas.microsoft.com/office/drawing/2018/hyperlinkcolor">
       <p:transition spd="med">
         <p:fade/>
       </p:transition>
@@ -13058,7 +13058,7 @@
         <p14:reveal/>
       </p:transition>
     </mc:Choice>
-    <mc:Fallback xmlns:ahyp="http://schemas.microsoft.com/office/drawing/2018/hyperlinkcolor" xmlns:p15="http://schemas.microsoft.com/office/powerpoint/2012/main" xmlns:com="http://schemas.openxmlformats.org/drawingml/2006/compatibility" xmlns:pvml="urn:schemas-microsoft-com:office:powerpoint" xmlns:v="urn:schemas-microsoft-com:vml" xmlns:o="urn:schemas-microsoft-com:office:office" xmlns:dgm="http://schemas.openxmlformats.org/drawingml/2006/diagram" xmlns:c="http://schemas.openxmlformats.org/drawingml/2006/chart" xmlns:mv="urn:schemas-microsoft-com:mac:vml" xmlns="">
+    <mc:Fallback xmlns="" xmlns:mv="urn:schemas-microsoft-com:mac:vml" xmlns:c="http://schemas.openxmlformats.org/drawingml/2006/chart" xmlns:dgm="http://schemas.openxmlformats.org/drawingml/2006/diagram" xmlns:o="urn:schemas-microsoft-com:office:office" xmlns:v="urn:schemas-microsoft-com:vml" xmlns:pvml="urn:schemas-microsoft-com:office:powerpoint" xmlns:com="http://schemas.openxmlformats.org/drawingml/2006/compatibility" xmlns:p15="http://schemas.microsoft.com/office/powerpoint/2012/main" xmlns:ahyp="http://schemas.microsoft.com/office/drawing/2018/hyperlinkcolor">
       <p:transition spd="med">
         <p:fade/>
       </p:transition>
@@ -13374,7 +13374,7 @@
         <p14:reveal/>
       </p:transition>
     </mc:Choice>
-    <mc:Fallback xmlns:ahyp="http://schemas.microsoft.com/office/drawing/2018/hyperlinkcolor" xmlns:p15="http://schemas.microsoft.com/office/powerpoint/2012/main" xmlns:com="http://schemas.openxmlformats.org/drawingml/2006/compatibility" xmlns:pvml="urn:schemas-microsoft-com:office:powerpoint" xmlns:v="urn:schemas-microsoft-com:vml" xmlns:o="urn:schemas-microsoft-com:office:office" xmlns:dgm="http://schemas.openxmlformats.org/drawingml/2006/diagram" xmlns:c="http://schemas.openxmlformats.org/drawingml/2006/chart" xmlns:mv="urn:schemas-microsoft-com:mac:vml" xmlns="">
+    <mc:Fallback xmlns="" xmlns:mv="urn:schemas-microsoft-com:mac:vml" xmlns:c="http://schemas.openxmlformats.org/drawingml/2006/chart" xmlns:dgm="http://schemas.openxmlformats.org/drawingml/2006/diagram" xmlns:o="urn:schemas-microsoft-com:office:office" xmlns:v="urn:schemas-microsoft-com:vml" xmlns:pvml="urn:schemas-microsoft-com:office:powerpoint" xmlns:com="http://schemas.openxmlformats.org/drawingml/2006/compatibility" xmlns:p15="http://schemas.microsoft.com/office/powerpoint/2012/main" xmlns:ahyp="http://schemas.microsoft.com/office/drawing/2018/hyperlinkcolor">
       <p:transition spd="med">
         <p:fade/>
       </p:transition>
@@ -13569,7 +13569,7 @@
         <p14:reveal/>
       </p:transition>
     </mc:Choice>
-    <mc:Fallback xmlns:ahyp="http://schemas.microsoft.com/office/drawing/2018/hyperlinkcolor" xmlns:p15="http://schemas.microsoft.com/office/powerpoint/2012/main" xmlns:com="http://schemas.openxmlformats.org/drawingml/2006/compatibility" xmlns:pvml="urn:schemas-microsoft-com:office:powerpoint" xmlns:v="urn:schemas-microsoft-com:vml" xmlns:o="urn:schemas-microsoft-com:office:office" xmlns:dgm="http://schemas.openxmlformats.org/drawingml/2006/diagram" xmlns:c="http://schemas.openxmlformats.org/drawingml/2006/chart" xmlns:mv="urn:schemas-microsoft-com:mac:vml" xmlns="">
+    <mc:Fallback xmlns="" xmlns:mv="urn:schemas-microsoft-com:mac:vml" xmlns:c="http://schemas.openxmlformats.org/drawingml/2006/chart" xmlns:dgm="http://schemas.openxmlformats.org/drawingml/2006/diagram" xmlns:o="urn:schemas-microsoft-com:office:office" xmlns:v="urn:schemas-microsoft-com:vml" xmlns:pvml="urn:schemas-microsoft-com:office:powerpoint" xmlns:com="http://schemas.openxmlformats.org/drawingml/2006/compatibility" xmlns:p15="http://schemas.microsoft.com/office/powerpoint/2012/main" xmlns:ahyp="http://schemas.microsoft.com/office/drawing/2018/hyperlinkcolor">
       <p:transition spd="med">
         <p:fade/>
       </p:transition>
@@ -14003,7 +14003,7 @@
         <p14:reveal/>
       </p:transition>
     </mc:Choice>
-    <mc:Fallback xmlns:ahyp="http://schemas.microsoft.com/office/drawing/2018/hyperlinkcolor" xmlns:p15="http://schemas.microsoft.com/office/powerpoint/2012/main" xmlns:com="http://schemas.openxmlformats.org/drawingml/2006/compatibility" xmlns:pvml="urn:schemas-microsoft-com:office:powerpoint" xmlns:v="urn:schemas-microsoft-com:vml" xmlns:o="urn:schemas-microsoft-com:office:office" xmlns:dgm="http://schemas.openxmlformats.org/drawingml/2006/diagram" xmlns:c="http://schemas.openxmlformats.org/drawingml/2006/chart" xmlns:mv="urn:schemas-microsoft-com:mac:vml" xmlns="">
+    <mc:Fallback xmlns="" xmlns:mv="urn:schemas-microsoft-com:mac:vml" xmlns:c="http://schemas.openxmlformats.org/drawingml/2006/chart" xmlns:dgm="http://schemas.openxmlformats.org/drawingml/2006/diagram" xmlns:o="urn:schemas-microsoft-com:office:office" xmlns:v="urn:schemas-microsoft-com:vml" xmlns:pvml="urn:schemas-microsoft-com:office:powerpoint" xmlns:com="http://schemas.openxmlformats.org/drawingml/2006/compatibility" xmlns:p15="http://schemas.microsoft.com/office/powerpoint/2012/main" xmlns:ahyp="http://schemas.microsoft.com/office/drawing/2018/hyperlinkcolor">
       <p:transition spd="med">
         <p:fade/>
       </p:transition>
@@ -14803,7 +14803,7 @@
         <p14:reveal/>
       </p:transition>
     </mc:Choice>
-    <mc:Fallback xmlns:ahyp="http://schemas.microsoft.com/office/drawing/2018/hyperlinkcolor" xmlns:p15="http://schemas.microsoft.com/office/powerpoint/2012/main" xmlns:com="http://schemas.openxmlformats.org/drawingml/2006/compatibility" xmlns:pvml="urn:schemas-microsoft-com:office:powerpoint" xmlns:v="urn:schemas-microsoft-com:vml" xmlns:o="urn:schemas-microsoft-com:office:office" xmlns:dgm="http://schemas.openxmlformats.org/drawingml/2006/diagram" xmlns:c="http://schemas.openxmlformats.org/drawingml/2006/chart" xmlns:mv="urn:schemas-microsoft-com:mac:vml" xmlns="">
+    <mc:Fallback xmlns="" xmlns:mv="urn:schemas-microsoft-com:mac:vml" xmlns:c="http://schemas.openxmlformats.org/drawingml/2006/chart" xmlns:dgm="http://schemas.openxmlformats.org/drawingml/2006/diagram" xmlns:o="urn:schemas-microsoft-com:office:office" xmlns:v="urn:schemas-microsoft-com:vml" xmlns:pvml="urn:schemas-microsoft-com:office:powerpoint" xmlns:com="http://schemas.openxmlformats.org/drawingml/2006/compatibility" xmlns:p15="http://schemas.microsoft.com/office/powerpoint/2012/main" xmlns:ahyp="http://schemas.microsoft.com/office/drawing/2018/hyperlinkcolor">
       <p:transition spd="med">
         <p:fade/>
       </p:transition>
@@ -14992,7 +14992,7 @@
         <p14:reveal/>
       </p:transition>
     </mc:Choice>
-    <mc:Fallback xmlns:ahyp="http://schemas.microsoft.com/office/drawing/2018/hyperlinkcolor" xmlns:p15="http://schemas.microsoft.com/office/powerpoint/2012/main" xmlns:com="http://schemas.openxmlformats.org/drawingml/2006/compatibility" xmlns:pvml="urn:schemas-microsoft-com:office:powerpoint" xmlns:v="urn:schemas-microsoft-com:vml" xmlns:o="urn:schemas-microsoft-com:office:office" xmlns:dgm="http://schemas.openxmlformats.org/drawingml/2006/diagram" xmlns:c="http://schemas.openxmlformats.org/drawingml/2006/chart" xmlns:mv="urn:schemas-microsoft-com:mac:vml" xmlns="">
+    <mc:Fallback xmlns="" xmlns:mv="urn:schemas-microsoft-com:mac:vml" xmlns:c="http://schemas.openxmlformats.org/drawingml/2006/chart" xmlns:dgm="http://schemas.openxmlformats.org/drawingml/2006/diagram" xmlns:o="urn:schemas-microsoft-com:office:office" xmlns:v="urn:schemas-microsoft-com:vml" xmlns:pvml="urn:schemas-microsoft-com:office:powerpoint" xmlns:com="http://schemas.openxmlformats.org/drawingml/2006/compatibility" xmlns:p15="http://schemas.microsoft.com/office/powerpoint/2012/main" xmlns:ahyp="http://schemas.microsoft.com/office/drawing/2018/hyperlinkcolor">
       <p:transition spd="med">
         <p:fade/>
       </p:transition>
@@ -15151,7 +15151,7 @@
         <p14:reveal/>
       </p:transition>
     </mc:Choice>
-    <mc:Fallback xmlns:ahyp="http://schemas.microsoft.com/office/drawing/2018/hyperlinkcolor" xmlns:p15="http://schemas.microsoft.com/office/powerpoint/2012/main" xmlns:com="http://schemas.openxmlformats.org/drawingml/2006/compatibility" xmlns:pvml="urn:schemas-microsoft-com:office:powerpoint" xmlns:v="urn:schemas-microsoft-com:vml" xmlns:o="urn:schemas-microsoft-com:office:office" xmlns:dgm="http://schemas.openxmlformats.org/drawingml/2006/diagram" xmlns:c="http://schemas.openxmlformats.org/drawingml/2006/chart" xmlns:mv="urn:schemas-microsoft-com:mac:vml" xmlns="">
+    <mc:Fallback xmlns="" xmlns:mv="urn:schemas-microsoft-com:mac:vml" xmlns:c="http://schemas.openxmlformats.org/drawingml/2006/chart" xmlns:dgm="http://schemas.openxmlformats.org/drawingml/2006/diagram" xmlns:o="urn:schemas-microsoft-com:office:office" xmlns:v="urn:schemas-microsoft-com:vml" xmlns:pvml="urn:schemas-microsoft-com:office:powerpoint" xmlns:com="http://schemas.openxmlformats.org/drawingml/2006/compatibility" xmlns:p15="http://schemas.microsoft.com/office/powerpoint/2012/main" xmlns:ahyp="http://schemas.microsoft.com/office/drawing/2018/hyperlinkcolor">
       <p:transition spd="med">
         <p:fade/>
       </p:transition>
@@ -16598,7 +16598,7 @@
         <p14:reveal/>
       </p:transition>
     </mc:Choice>
-    <mc:Fallback xmlns:ahyp="http://schemas.microsoft.com/office/drawing/2018/hyperlinkcolor" xmlns:p15="http://schemas.microsoft.com/office/powerpoint/2012/main" xmlns:com="http://schemas.openxmlformats.org/drawingml/2006/compatibility" xmlns:pvml="urn:schemas-microsoft-com:office:powerpoint" xmlns:v="urn:schemas-microsoft-com:vml" xmlns:o="urn:schemas-microsoft-com:office:office" xmlns:dgm="http://schemas.openxmlformats.org/drawingml/2006/diagram" xmlns:c="http://schemas.openxmlformats.org/drawingml/2006/chart" xmlns:mv="urn:schemas-microsoft-com:mac:vml" xmlns="">
+    <mc:Fallback xmlns="" xmlns:mv="urn:schemas-microsoft-com:mac:vml" xmlns:c="http://schemas.openxmlformats.org/drawingml/2006/chart" xmlns:dgm="http://schemas.openxmlformats.org/drawingml/2006/diagram" xmlns:o="urn:schemas-microsoft-com:office:office" xmlns:v="urn:schemas-microsoft-com:vml" xmlns:pvml="urn:schemas-microsoft-com:office:powerpoint" xmlns:com="http://schemas.openxmlformats.org/drawingml/2006/compatibility" xmlns:p15="http://schemas.microsoft.com/office/powerpoint/2012/main" xmlns:ahyp="http://schemas.microsoft.com/office/drawing/2018/hyperlinkcolor">
       <p:transition spd="med">
         <p:fade/>
       </p:transition>
@@ -16755,7 +16755,7 @@
         <p14:reveal/>
       </p:transition>
     </mc:Choice>
-    <mc:Fallback xmlns:ahyp="http://schemas.microsoft.com/office/drawing/2018/hyperlinkcolor" xmlns:p15="http://schemas.microsoft.com/office/powerpoint/2012/main" xmlns:com="http://schemas.openxmlformats.org/drawingml/2006/compatibility" xmlns:pvml="urn:schemas-microsoft-com:office:powerpoint" xmlns:v="urn:schemas-microsoft-com:vml" xmlns:o="urn:schemas-microsoft-com:office:office" xmlns:dgm="http://schemas.openxmlformats.org/drawingml/2006/diagram" xmlns:c="http://schemas.openxmlformats.org/drawingml/2006/chart" xmlns:mv="urn:schemas-microsoft-com:mac:vml" xmlns="">
+    <mc:Fallback xmlns="" xmlns:mv="urn:schemas-microsoft-com:mac:vml" xmlns:c="http://schemas.openxmlformats.org/drawingml/2006/chart" xmlns:dgm="http://schemas.openxmlformats.org/drawingml/2006/diagram" xmlns:o="urn:schemas-microsoft-com:office:office" xmlns:v="urn:schemas-microsoft-com:vml" xmlns:pvml="urn:schemas-microsoft-com:office:powerpoint" xmlns:com="http://schemas.openxmlformats.org/drawingml/2006/compatibility" xmlns:p15="http://schemas.microsoft.com/office/powerpoint/2012/main" xmlns:ahyp="http://schemas.microsoft.com/office/drawing/2018/hyperlinkcolor">
       <p:transition spd="med">
         <p:fade/>
       </p:transition>
@@ -17138,7 +17138,7 @@
         <p14:reveal/>
       </p:transition>
     </mc:Choice>
-    <mc:Fallback xmlns:ahyp="http://schemas.microsoft.com/office/drawing/2018/hyperlinkcolor" xmlns:p15="http://schemas.microsoft.com/office/powerpoint/2012/main" xmlns:com="http://schemas.openxmlformats.org/drawingml/2006/compatibility" xmlns:pvml="urn:schemas-microsoft-com:office:powerpoint" xmlns:v="urn:schemas-microsoft-com:vml" xmlns:o="urn:schemas-microsoft-com:office:office" xmlns:dgm="http://schemas.openxmlformats.org/drawingml/2006/diagram" xmlns:c="http://schemas.openxmlformats.org/drawingml/2006/chart" xmlns:mv="urn:schemas-microsoft-com:mac:vml" xmlns="">
+    <mc:Fallback xmlns="" xmlns:mv="urn:schemas-microsoft-com:mac:vml" xmlns:c="http://schemas.openxmlformats.org/drawingml/2006/chart" xmlns:dgm="http://schemas.openxmlformats.org/drawingml/2006/diagram" xmlns:o="urn:schemas-microsoft-com:office:office" xmlns:v="urn:schemas-microsoft-com:vml" xmlns:pvml="urn:schemas-microsoft-com:office:powerpoint" xmlns:com="http://schemas.openxmlformats.org/drawingml/2006/compatibility" xmlns:p15="http://schemas.microsoft.com/office/powerpoint/2012/main" xmlns:ahyp="http://schemas.microsoft.com/office/drawing/2018/hyperlinkcolor">
       <p:transition spd="med">
         <p:fade/>
       </p:transition>
@@ -17210,7 +17210,7 @@
         <p14:reveal/>
       </p:transition>
     </mc:Choice>
-    <mc:Fallback xmlns:ahyp="http://schemas.microsoft.com/office/drawing/2018/hyperlinkcolor" xmlns:p15="http://schemas.microsoft.com/office/powerpoint/2012/main" xmlns:com="http://schemas.openxmlformats.org/drawingml/2006/compatibility" xmlns:pvml="urn:schemas-microsoft-com:office:powerpoint" xmlns:v="urn:schemas-microsoft-com:vml" xmlns:o="urn:schemas-microsoft-com:office:office" xmlns:dgm="http://schemas.openxmlformats.org/drawingml/2006/diagram" xmlns:c="http://schemas.openxmlformats.org/drawingml/2006/chart" xmlns:mv="urn:schemas-microsoft-com:mac:vml" xmlns="">
+    <mc:Fallback xmlns="" xmlns:mv="urn:schemas-microsoft-com:mac:vml" xmlns:c="http://schemas.openxmlformats.org/drawingml/2006/chart" xmlns:dgm="http://schemas.openxmlformats.org/drawingml/2006/diagram" xmlns:o="urn:schemas-microsoft-com:office:office" xmlns:v="urn:schemas-microsoft-com:vml" xmlns:pvml="urn:schemas-microsoft-com:office:powerpoint" xmlns:com="http://schemas.openxmlformats.org/drawingml/2006/compatibility" xmlns:p15="http://schemas.microsoft.com/office/powerpoint/2012/main" xmlns:ahyp="http://schemas.microsoft.com/office/drawing/2018/hyperlinkcolor">
       <p:transition spd="med">
         <p:fade/>
       </p:transition>
@@ -17804,7 +17804,7 @@
         <p14:reveal/>
       </p:transition>
     </mc:Choice>
-    <mc:Fallback xmlns:ahyp="http://schemas.microsoft.com/office/drawing/2018/hyperlinkcolor" xmlns:p15="http://schemas.microsoft.com/office/powerpoint/2012/main" xmlns:com="http://schemas.openxmlformats.org/drawingml/2006/compatibility" xmlns:pvml="urn:schemas-microsoft-com:office:powerpoint" xmlns:v="urn:schemas-microsoft-com:vml" xmlns:o="urn:schemas-microsoft-com:office:office" xmlns:dgm="http://schemas.openxmlformats.org/drawingml/2006/diagram" xmlns:c="http://schemas.openxmlformats.org/drawingml/2006/chart" xmlns:mv="urn:schemas-microsoft-com:mac:vml" xmlns="">
+    <mc:Fallback xmlns="" xmlns:mv="urn:schemas-microsoft-com:mac:vml" xmlns:c="http://schemas.openxmlformats.org/drawingml/2006/chart" xmlns:dgm="http://schemas.openxmlformats.org/drawingml/2006/diagram" xmlns:o="urn:schemas-microsoft-com:office:office" xmlns:v="urn:schemas-microsoft-com:vml" xmlns:pvml="urn:schemas-microsoft-com:office:powerpoint" xmlns:com="http://schemas.openxmlformats.org/drawingml/2006/compatibility" xmlns:p15="http://schemas.microsoft.com/office/powerpoint/2012/main" xmlns:ahyp="http://schemas.microsoft.com/office/drawing/2018/hyperlinkcolor">
       <p:transition spd="med">
         <p:fade/>
       </p:transition>
@@ -18477,7 +18477,7 @@
         <p14:reveal/>
       </p:transition>
     </mc:Choice>
-    <mc:Fallback xmlns:ahyp="http://schemas.microsoft.com/office/drawing/2018/hyperlinkcolor" xmlns:p15="http://schemas.microsoft.com/office/powerpoint/2012/main" xmlns:com="http://schemas.openxmlformats.org/drawingml/2006/compatibility" xmlns:pvml="urn:schemas-microsoft-com:office:powerpoint" xmlns:v="urn:schemas-microsoft-com:vml" xmlns:o="urn:schemas-microsoft-com:office:office" xmlns:dgm="http://schemas.openxmlformats.org/drawingml/2006/diagram" xmlns:c="http://schemas.openxmlformats.org/drawingml/2006/chart" xmlns:mv="urn:schemas-microsoft-com:mac:vml" xmlns="">
+    <mc:Fallback xmlns="" xmlns:mv="urn:schemas-microsoft-com:mac:vml" xmlns:c="http://schemas.openxmlformats.org/drawingml/2006/chart" xmlns:dgm="http://schemas.openxmlformats.org/drawingml/2006/diagram" xmlns:o="urn:schemas-microsoft-com:office:office" xmlns:v="urn:schemas-microsoft-com:vml" xmlns:pvml="urn:schemas-microsoft-com:office:powerpoint" xmlns:com="http://schemas.openxmlformats.org/drawingml/2006/compatibility" xmlns:p15="http://schemas.microsoft.com/office/powerpoint/2012/main" xmlns:ahyp="http://schemas.microsoft.com/office/drawing/2018/hyperlinkcolor">
       <p:transition spd="med">
         <p:fade/>
       </p:transition>
@@ -20127,7 +20127,7 @@
         <p14:reveal/>
       </p:transition>
     </mc:Choice>
-    <mc:Fallback xmlns:ahyp="http://schemas.microsoft.com/office/drawing/2018/hyperlinkcolor" xmlns:p15="http://schemas.microsoft.com/office/powerpoint/2012/main" xmlns:com="http://schemas.openxmlformats.org/drawingml/2006/compatibility" xmlns:pvml="urn:schemas-microsoft-com:office:powerpoint" xmlns:v="urn:schemas-microsoft-com:vml" xmlns:o="urn:schemas-microsoft-com:office:office" xmlns:dgm="http://schemas.openxmlformats.org/drawingml/2006/diagram" xmlns:c="http://schemas.openxmlformats.org/drawingml/2006/chart" xmlns:mv="urn:schemas-microsoft-com:mac:vml" xmlns="">
+    <mc:Fallback xmlns="" xmlns:mv="urn:schemas-microsoft-com:mac:vml" xmlns:c="http://schemas.openxmlformats.org/drawingml/2006/chart" xmlns:dgm="http://schemas.openxmlformats.org/drawingml/2006/diagram" xmlns:o="urn:schemas-microsoft-com:office:office" xmlns:v="urn:schemas-microsoft-com:vml" xmlns:pvml="urn:schemas-microsoft-com:office:powerpoint" xmlns:com="http://schemas.openxmlformats.org/drawingml/2006/compatibility" xmlns:p15="http://schemas.microsoft.com/office/powerpoint/2012/main" xmlns:ahyp="http://schemas.microsoft.com/office/drawing/2018/hyperlinkcolor">
       <p:transition spd="med">
         <p:fade/>
       </p:transition>
@@ -23505,7 +23505,7 @@
         <p14:reveal/>
       </p:transition>
     </mc:Choice>
-    <mc:Fallback xmlns:ahyp="http://schemas.microsoft.com/office/drawing/2018/hyperlinkcolor" xmlns:p15="http://schemas.microsoft.com/office/powerpoint/2012/main" xmlns:com="http://schemas.openxmlformats.org/drawingml/2006/compatibility" xmlns:pvml="urn:schemas-microsoft-com:office:powerpoint" xmlns:v="urn:schemas-microsoft-com:vml" xmlns:o="urn:schemas-microsoft-com:office:office" xmlns:dgm="http://schemas.openxmlformats.org/drawingml/2006/diagram" xmlns:c="http://schemas.openxmlformats.org/drawingml/2006/chart" xmlns:mv="urn:schemas-microsoft-com:mac:vml" xmlns="">
+    <mc:Fallback xmlns="" xmlns:mv="urn:schemas-microsoft-com:mac:vml" xmlns:c="http://schemas.openxmlformats.org/drawingml/2006/chart" xmlns:dgm="http://schemas.openxmlformats.org/drawingml/2006/diagram" xmlns:o="urn:schemas-microsoft-com:office:office" xmlns:v="urn:schemas-microsoft-com:vml" xmlns:pvml="urn:schemas-microsoft-com:office:powerpoint" xmlns:com="http://schemas.openxmlformats.org/drawingml/2006/compatibility" xmlns:p15="http://schemas.microsoft.com/office/powerpoint/2012/main" xmlns:ahyp="http://schemas.microsoft.com/office/drawing/2018/hyperlinkcolor">
       <p:transition spd="med">
         <p:fade/>
       </p:transition>
@@ -24885,7 +24885,7 @@
         <p14:reveal/>
       </p:transition>
     </mc:Choice>
-    <mc:Fallback xmlns:ahyp="http://schemas.microsoft.com/office/drawing/2018/hyperlinkcolor" xmlns:p15="http://schemas.microsoft.com/office/powerpoint/2012/main" xmlns:com="http://schemas.openxmlformats.org/drawingml/2006/compatibility" xmlns:pvml="urn:schemas-microsoft-com:office:powerpoint" xmlns:v="urn:schemas-microsoft-com:vml" xmlns:o="urn:schemas-microsoft-com:office:office" xmlns:dgm="http://schemas.openxmlformats.org/drawingml/2006/diagram" xmlns:c="http://schemas.openxmlformats.org/drawingml/2006/chart" xmlns:mv="urn:schemas-microsoft-com:mac:vml" xmlns="">
+    <mc:Fallback xmlns="" xmlns:mv="urn:schemas-microsoft-com:mac:vml" xmlns:c="http://schemas.openxmlformats.org/drawingml/2006/chart" xmlns:dgm="http://schemas.openxmlformats.org/drawingml/2006/diagram" xmlns:o="urn:schemas-microsoft-com:office:office" xmlns:v="urn:schemas-microsoft-com:vml" xmlns:pvml="urn:schemas-microsoft-com:office:powerpoint" xmlns:com="http://schemas.openxmlformats.org/drawingml/2006/compatibility" xmlns:p15="http://schemas.microsoft.com/office/powerpoint/2012/main" xmlns:ahyp="http://schemas.microsoft.com/office/drawing/2018/hyperlinkcolor">
       <p:transition spd="med">
         <p:fade/>
       </p:transition>
@@ -27861,7 +27861,7 @@
         <p14:reveal/>
       </p:transition>
     </mc:Choice>
-    <mc:Fallback xmlns:ahyp="http://schemas.microsoft.com/office/drawing/2018/hyperlinkcolor" xmlns:p15="http://schemas.microsoft.com/office/powerpoint/2012/main" xmlns:com="http://schemas.openxmlformats.org/drawingml/2006/compatibility" xmlns:pvml="urn:schemas-microsoft-com:office:powerpoint" xmlns:v="urn:schemas-microsoft-com:vml" xmlns:o="urn:schemas-microsoft-com:office:office" xmlns:dgm="http://schemas.openxmlformats.org/drawingml/2006/diagram" xmlns:c="http://schemas.openxmlformats.org/drawingml/2006/chart" xmlns:mv="urn:schemas-microsoft-com:mac:vml" xmlns="">
+    <mc:Fallback xmlns="" xmlns:mv="urn:schemas-microsoft-com:mac:vml" xmlns:c="http://schemas.openxmlformats.org/drawingml/2006/chart" xmlns:dgm="http://schemas.openxmlformats.org/drawingml/2006/diagram" xmlns:o="urn:schemas-microsoft-com:office:office" xmlns:v="urn:schemas-microsoft-com:vml" xmlns:pvml="urn:schemas-microsoft-com:office:powerpoint" xmlns:com="http://schemas.openxmlformats.org/drawingml/2006/compatibility" xmlns:p15="http://schemas.microsoft.com/office/powerpoint/2012/main" xmlns:ahyp="http://schemas.microsoft.com/office/drawing/2018/hyperlinkcolor">
       <p:transition spd="med">
         <p:fade/>
       </p:transition>
@@ -28550,7 +28550,7 @@
           <a:p>
             <a:r>
               <a:rPr lang="fr-BE"/>
-              <a:t>Partez de l'exo 13-03-24</a:t>
+              <a:t>Partez de l'exo 13-53-24</a:t>
             </a:r>
           </a:p>
           <a:p>
@@ -28692,7 +28692,7 @@
         <p14:reveal/>
       </p:transition>
     </mc:Choice>
-    <mc:Fallback xmlns:ahyp="http://schemas.microsoft.com/office/drawing/2018/hyperlinkcolor" xmlns:p15="http://schemas.microsoft.com/office/powerpoint/2012/main" xmlns:com="http://schemas.openxmlformats.org/drawingml/2006/compatibility" xmlns:pvml="urn:schemas-microsoft-com:office:powerpoint" xmlns:v="urn:schemas-microsoft-com:vml" xmlns:o="urn:schemas-microsoft-com:office:office" xmlns:dgm="http://schemas.openxmlformats.org/drawingml/2006/diagram" xmlns:c="http://schemas.openxmlformats.org/drawingml/2006/chart" xmlns:mv="urn:schemas-microsoft-com:mac:vml" xmlns="">
+    <mc:Fallback xmlns="" xmlns:mv="urn:schemas-microsoft-com:mac:vml" xmlns:c="http://schemas.openxmlformats.org/drawingml/2006/chart" xmlns:dgm="http://schemas.openxmlformats.org/drawingml/2006/diagram" xmlns:o="urn:schemas-microsoft-com:office:office" xmlns:v="urn:schemas-microsoft-com:vml" xmlns:pvml="urn:schemas-microsoft-com:office:powerpoint" xmlns:com="http://schemas.openxmlformats.org/drawingml/2006/compatibility" xmlns:p15="http://schemas.microsoft.com/office/powerpoint/2012/main" xmlns:ahyp="http://schemas.microsoft.com/office/drawing/2018/hyperlinkcolor">
       <p:transition spd="med">
         <p:fade/>
       </p:transition>
@@ -28837,7 +28837,7 @@
         <p14:reveal/>
       </p:transition>
     </mc:Choice>
-    <mc:Fallback xmlns:ahyp="http://schemas.microsoft.com/office/drawing/2018/hyperlinkcolor" xmlns:p15="http://schemas.microsoft.com/office/powerpoint/2012/main" xmlns:com="http://schemas.openxmlformats.org/drawingml/2006/compatibility" xmlns:pvml="urn:schemas-microsoft-com:office:powerpoint" xmlns:v="urn:schemas-microsoft-com:vml" xmlns:o="urn:schemas-microsoft-com:office:office" xmlns:dgm="http://schemas.openxmlformats.org/drawingml/2006/diagram" xmlns:c="http://schemas.openxmlformats.org/drawingml/2006/chart" xmlns:mv="urn:schemas-microsoft-com:mac:vml" xmlns="">
+    <mc:Fallback xmlns="" xmlns:mv="urn:schemas-microsoft-com:mac:vml" xmlns:c="http://schemas.openxmlformats.org/drawingml/2006/chart" xmlns:dgm="http://schemas.openxmlformats.org/drawingml/2006/diagram" xmlns:o="urn:schemas-microsoft-com:office:office" xmlns:v="urn:schemas-microsoft-com:vml" xmlns:pvml="urn:schemas-microsoft-com:office:powerpoint" xmlns:com="http://schemas.openxmlformats.org/drawingml/2006/compatibility" xmlns:p15="http://schemas.microsoft.com/office/powerpoint/2012/main" xmlns:ahyp="http://schemas.microsoft.com/office/drawing/2018/hyperlinkcolor">
       <p:transition spd="med">
         <p:fade/>
       </p:transition>
@@ -29182,7 +29182,7 @@
         <p14:reveal/>
       </p:transition>
     </mc:Choice>
-    <mc:Fallback xmlns:ahyp="http://schemas.microsoft.com/office/drawing/2018/hyperlinkcolor" xmlns:p15="http://schemas.microsoft.com/office/powerpoint/2012/main" xmlns:com="http://schemas.openxmlformats.org/drawingml/2006/compatibility" xmlns:pvml="urn:schemas-microsoft-com:office:powerpoint" xmlns:v="urn:schemas-microsoft-com:vml" xmlns:o="urn:schemas-microsoft-com:office:office" xmlns:dgm="http://schemas.openxmlformats.org/drawingml/2006/diagram" xmlns:c="http://schemas.openxmlformats.org/drawingml/2006/chart" xmlns:mv="urn:schemas-microsoft-com:mac:vml" xmlns="">
+    <mc:Fallback xmlns="" xmlns:mv="urn:schemas-microsoft-com:mac:vml" xmlns:c="http://schemas.openxmlformats.org/drawingml/2006/chart" xmlns:dgm="http://schemas.openxmlformats.org/drawingml/2006/diagram" xmlns:o="urn:schemas-microsoft-com:office:office" xmlns:v="urn:schemas-microsoft-com:vml" xmlns:pvml="urn:schemas-microsoft-com:office:powerpoint" xmlns:com="http://schemas.openxmlformats.org/drawingml/2006/compatibility" xmlns:p15="http://schemas.microsoft.com/office/powerpoint/2012/main" xmlns:ahyp="http://schemas.microsoft.com/office/drawing/2018/hyperlinkcolor">
       <p:transition spd="med">
         <p:fade/>
       </p:transition>
@@ -29263,7 +29263,7 @@
         <p14:reveal/>
       </p:transition>
     </mc:Choice>
-    <mc:Fallback xmlns:ahyp="http://schemas.microsoft.com/office/drawing/2018/hyperlinkcolor" xmlns:p15="http://schemas.microsoft.com/office/powerpoint/2012/main" xmlns:com="http://schemas.openxmlformats.org/drawingml/2006/compatibility" xmlns:pvml="urn:schemas-microsoft-com:office:powerpoint" xmlns:v="urn:schemas-microsoft-com:vml" xmlns:o="urn:schemas-microsoft-com:office:office" xmlns:dgm="http://schemas.openxmlformats.org/drawingml/2006/diagram" xmlns:c="http://schemas.openxmlformats.org/drawingml/2006/chart" xmlns:mv="urn:schemas-microsoft-com:mac:vml" xmlns="">
+    <mc:Fallback xmlns="" xmlns:mv="urn:schemas-microsoft-com:mac:vml" xmlns:c="http://schemas.openxmlformats.org/drawingml/2006/chart" xmlns:dgm="http://schemas.openxmlformats.org/drawingml/2006/diagram" xmlns:o="urn:schemas-microsoft-com:office:office" xmlns:v="urn:schemas-microsoft-com:vml" xmlns:pvml="urn:schemas-microsoft-com:office:powerpoint" xmlns:com="http://schemas.openxmlformats.org/drawingml/2006/compatibility" xmlns:p15="http://schemas.microsoft.com/office/powerpoint/2012/main" xmlns:ahyp="http://schemas.microsoft.com/office/drawing/2018/hyperlinkcolor">
       <p:transition spd="med">
         <p:fade/>
       </p:transition>

</xml_diff>